<commit_message>
ui changes +-final flowchart replaced counter 2 with counter
</commit_message>
<xml_diff>
--- a/React component lifecycle.pptx
+++ b/React component lifecycle.pptx
@@ -6,6 +6,7 @@
   </p:sldMasterIdLst>
   <p:sldIdLst>
     <p:sldId id="257" r:id="rId2"/>
+    <p:sldId id="258" r:id="rId3"/>
   </p:sldIdLst>
   <p:sldSz cx="12192000" cy="6858000"/>
   <p:notesSz cx="6858000" cy="9144000"/>
@@ -243,9 +244,9 @@
           <a:p>
             <a:fld id="{EE844072-81E0-44CE-8CF3-79AEA47A879C}" type="datetimeFigureOut">
               <a:rPr lang="en-US" smtClean="0"/>
-              <a:t>11/20/2020</a:t>
+              <a:t>11/23/2020</a:t>
             </a:fld>
-            <a:endParaRPr lang="en-US"/>
+            <a:endParaRPr lang="en-US" dirty="0"/>
           </a:p>
         </p:txBody>
       </p:sp>
@@ -264,7 +265,7 @@
           <a:bodyPr/>
           <a:lstStyle/>
           <a:p>
-            <a:endParaRPr lang="en-US"/>
+            <a:endParaRPr lang="en-US" dirty="0"/>
           </a:p>
         </p:txBody>
       </p:sp>
@@ -287,7 +288,7 @@
               <a:rPr lang="en-US" smtClean="0"/>
               <a:t>‹#›</a:t>
             </a:fld>
-            <a:endParaRPr lang="en-US"/>
+            <a:endParaRPr lang="en-US" dirty="0"/>
           </a:p>
         </p:txBody>
       </p:sp>
@@ -413,9 +414,9 @@
           <a:p>
             <a:fld id="{EE844072-81E0-44CE-8CF3-79AEA47A879C}" type="datetimeFigureOut">
               <a:rPr lang="en-US" smtClean="0"/>
-              <a:t>11/20/2020</a:t>
+              <a:t>11/23/2020</a:t>
             </a:fld>
-            <a:endParaRPr lang="en-US"/>
+            <a:endParaRPr lang="en-US" dirty="0"/>
           </a:p>
         </p:txBody>
       </p:sp>
@@ -434,7 +435,7 @@
           <a:bodyPr/>
           <a:lstStyle/>
           <a:p>
-            <a:endParaRPr lang="en-US"/>
+            <a:endParaRPr lang="en-US" dirty="0"/>
           </a:p>
         </p:txBody>
       </p:sp>
@@ -457,7 +458,7 @@
               <a:rPr lang="en-US" smtClean="0"/>
               <a:t>‹#›</a:t>
             </a:fld>
-            <a:endParaRPr lang="en-US"/>
+            <a:endParaRPr lang="en-US" dirty="0"/>
           </a:p>
         </p:txBody>
       </p:sp>
@@ -593,9 +594,9 @@
           <a:p>
             <a:fld id="{EE844072-81E0-44CE-8CF3-79AEA47A879C}" type="datetimeFigureOut">
               <a:rPr lang="en-US" smtClean="0"/>
-              <a:t>11/20/2020</a:t>
+              <a:t>11/23/2020</a:t>
             </a:fld>
-            <a:endParaRPr lang="en-US"/>
+            <a:endParaRPr lang="en-US" dirty="0"/>
           </a:p>
         </p:txBody>
       </p:sp>
@@ -614,7 +615,7 @@
           <a:bodyPr/>
           <a:lstStyle/>
           <a:p>
-            <a:endParaRPr lang="en-US"/>
+            <a:endParaRPr lang="en-US" dirty="0"/>
           </a:p>
         </p:txBody>
       </p:sp>
@@ -637,7 +638,7 @@
               <a:rPr lang="en-US" smtClean="0"/>
               <a:t>‹#›</a:t>
             </a:fld>
-            <a:endParaRPr lang="en-US"/>
+            <a:endParaRPr lang="en-US" dirty="0"/>
           </a:p>
         </p:txBody>
       </p:sp>
@@ -763,9 +764,9 @@
           <a:p>
             <a:fld id="{EE844072-81E0-44CE-8CF3-79AEA47A879C}" type="datetimeFigureOut">
               <a:rPr lang="en-US" smtClean="0"/>
-              <a:t>11/20/2020</a:t>
+              <a:t>11/23/2020</a:t>
             </a:fld>
-            <a:endParaRPr lang="en-US"/>
+            <a:endParaRPr lang="en-US" dirty="0"/>
           </a:p>
         </p:txBody>
       </p:sp>
@@ -784,7 +785,7 @@
           <a:bodyPr/>
           <a:lstStyle/>
           <a:p>
-            <a:endParaRPr lang="en-US"/>
+            <a:endParaRPr lang="en-US" dirty="0"/>
           </a:p>
         </p:txBody>
       </p:sp>
@@ -807,7 +808,7 @@
               <a:rPr lang="en-US" smtClean="0"/>
               <a:t>‹#›</a:t>
             </a:fld>
-            <a:endParaRPr lang="en-US"/>
+            <a:endParaRPr lang="en-US" dirty="0"/>
           </a:p>
         </p:txBody>
       </p:sp>
@@ -1009,9 +1010,9 @@
           <a:p>
             <a:fld id="{EE844072-81E0-44CE-8CF3-79AEA47A879C}" type="datetimeFigureOut">
               <a:rPr lang="en-US" smtClean="0"/>
-              <a:t>11/20/2020</a:t>
+              <a:t>11/23/2020</a:t>
             </a:fld>
-            <a:endParaRPr lang="en-US"/>
+            <a:endParaRPr lang="en-US" dirty="0"/>
           </a:p>
         </p:txBody>
       </p:sp>
@@ -1030,7 +1031,7 @@
           <a:bodyPr/>
           <a:lstStyle/>
           <a:p>
-            <a:endParaRPr lang="en-US"/>
+            <a:endParaRPr lang="en-US" dirty="0"/>
           </a:p>
         </p:txBody>
       </p:sp>
@@ -1053,7 +1054,7 @@
               <a:rPr lang="en-US" smtClean="0"/>
               <a:t>‹#›</a:t>
             </a:fld>
-            <a:endParaRPr lang="en-US"/>
+            <a:endParaRPr lang="en-US" dirty="0"/>
           </a:p>
         </p:txBody>
       </p:sp>
@@ -1241,9 +1242,9 @@
           <a:p>
             <a:fld id="{EE844072-81E0-44CE-8CF3-79AEA47A879C}" type="datetimeFigureOut">
               <a:rPr lang="en-US" smtClean="0"/>
-              <a:t>11/20/2020</a:t>
+              <a:t>11/23/2020</a:t>
             </a:fld>
-            <a:endParaRPr lang="en-US"/>
+            <a:endParaRPr lang="en-US" dirty="0"/>
           </a:p>
         </p:txBody>
       </p:sp>
@@ -1262,7 +1263,7 @@
           <a:bodyPr/>
           <a:lstStyle/>
           <a:p>
-            <a:endParaRPr lang="en-US"/>
+            <a:endParaRPr lang="en-US" dirty="0"/>
           </a:p>
         </p:txBody>
       </p:sp>
@@ -1285,7 +1286,7 @@
               <a:rPr lang="en-US" smtClean="0"/>
               <a:t>‹#›</a:t>
             </a:fld>
-            <a:endParaRPr lang="en-US"/>
+            <a:endParaRPr lang="en-US" dirty="0"/>
           </a:p>
         </p:txBody>
       </p:sp>
@@ -1608,9 +1609,9 @@
           <a:p>
             <a:fld id="{EE844072-81E0-44CE-8CF3-79AEA47A879C}" type="datetimeFigureOut">
               <a:rPr lang="en-US" smtClean="0"/>
-              <a:t>11/20/2020</a:t>
+              <a:t>11/23/2020</a:t>
             </a:fld>
-            <a:endParaRPr lang="en-US"/>
+            <a:endParaRPr lang="en-US" dirty="0"/>
           </a:p>
         </p:txBody>
       </p:sp>
@@ -1629,7 +1630,7 @@
           <a:bodyPr/>
           <a:lstStyle/>
           <a:p>
-            <a:endParaRPr lang="en-US"/>
+            <a:endParaRPr lang="en-US" dirty="0"/>
           </a:p>
         </p:txBody>
       </p:sp>
@@ -1652,7 +1653,7 @@
               <a:rPr lang="en-US" smtClean="0"/>
               <a:t>‹#›</a:t>
             </a:fld>
-            <a:endParaRPr lang="en-US"/>
+            <a:endParaRPr lang="en-US" dirty="0"/>
           </a:p>
         </p:txBody>
       </p:sp>
@@ -1726,9 +1727,9 @@
           <a:p>
             <a:fld id="{EE844072-81E0-44CE-8CF3-79AEA47A879C}" type="datetimeFigureOut">
               <a:rPr lang="en-US" smtClean="0"/>
-              <a:t>11/20/2020</a:t>
+              <a:t>11/23/2020</a:t>
             </a:fld>
-            <a:endParaRPr lang="en-US"/>
+            <a:endParaRPr lang="en-US" dirty="0"/>
           </a:p>
         </p:txBody>
       </p:sp>
@@ -1747,7 +1748,7 @@
           <a:bodyPr/>
           <a:lstStyle/>
           <a:p>
-            <a:endParaRPr lang="en-US"/>
+            <a:endParaRPr lang="en-US" dirty="0"/>
           </a:p>
         </p:txBody>
       </p:sp>
@@ -1770,7 +1771,7 @@
               <a:rPr lang="en-US" smtClean="0"/>
               <a:t>‹#›</a:t>
             </a:fld>
-            <a:endParaRPr lang="en-US"/>
+            <a:endParaRPr lang="en-US" dirty="0"/>
           </a:p>
         </p:txBody>
       </p:sp>
@@ -1821,9 +1822,9 @@
           <a:p>
             <a:fld id="{EE844072-81E0-44CE-8CF3-79AEA47A879C}" type="datetimeFigureOut">
               <a:rPr lang="en-US" smtClean="0"/>
-              <a:t>11/20/2020</a:t>
+              <a:t>11/23/2020</a:t>
             </a:fld>
-            <a:endParaRPr lang="en-US"/>
+            <a:endParaRPr lang="en-US" dirty="0"/>
           </a:p>
         </p:txBody>
       </p:sp>
@@ -1842,7 +1843,7 @@
           <a:bodyPr/>
           <a:lstStyle/>
           <a:p>
-            <a:endParaRPr lang="en-US"/>
+            <a:endParaRPr lang="en-US" dirty="0"/>
           </a:p>
         </p:txBody>
       </p:sp>
@@ -1865,7 +1866,7 @@
               <a:rPr lang="en-US" smtClean="0"/>
               <a:t>‹#›</a:t>
             </a:fld>
-            <a:endParaRPr lang="en-US"/>
+            <a:endParaRPr lang="en-US" dirty="0"/>
           </a:p>
         </p:txBody>
       </p:sp>
@@ -2098,9 +2099,9 @@
           <a:p>
             <a:fld id="{EE844072-81E0-44CE-8CF3-79AEA47A879C}" type="datetimeFigureOut">
               <a:rPr lang="en-US" smtClean="0"/>
-              <a:t>11/20/2020</a:t>
+              <a:t>11/23/2020</a:t>
             </a:fld>
-            <a:endParaRPr lang="en-US"/>
+            <a:endParaRPr lang="en-US" dirty="0"/>
           </a:p>
         </p:txBody>
       </p:sp>
@@ -2119,7 +2120,7 @@
           <a:bodyPr/>
           <a:lstStyle/>
           <a:p>
-            <a:endParaRPr lang="en-US"/>
+            <a:endParaRPr lang="en-US" dirty="0"/>
           </a:p>
         </p:txBody>
       </p:sp>
@@ -2142,7 +2143,7 @@
               <a:rPr lang="en-US" smtClean="0"/>
               <a:t>‹#›</a:t>
             </a:fld>
-            <a:endParaRPr lang="en-US"/>
+            <a:endParaRPr lang="en-US" dirty="0"/>
           </a:p>
         </p:txBody>
       </p:sp>
@@ -2265,7 +2266,7 @@
             </a:lvl9pPr>
           </a:lstStyle>
           <a:p>
-            <a:endParaRPr lang="en-US"/>
+            <a:endParaRPr lang="en-US" dirty="0"/>
           </a:p>
         </p:txBody>
       </p:sp>
@@ -2351,9 +2352,9 @@
           <a:p>
             <a:fld id="{EE844072-81E0-44CE-8CF3-79AEA47A879C}" type="datetimeFigureOut">
               <a:rPr lang="en-US" smtClean="0"/>
-              <a:t>11/20/2020</a:t>
+              <a:t>11/23/2020</a:t>
             </a:fld>
-            <a:endParaRPr lang="en-US"/>
+            <a:endParaRPr lang="en-US" dirty="0"/>
           </a:p>
         </p:txBody>
       </p:sp>
@@ -2372,7 +2373,7 @@
           <a:bodyPr/>
           <a:lstStyle/>
           <a:p>
-            <a:endParaRPr lang="en-US"/>
+            <a:endParaRPr lang="en-US" dirty="0"/>
           </a:p>
         </p:txBody>
       </p:sp>
@@ -2395,7 +2396,7 @@
               <a:rPr lang="en-US" smtClean="0"/>
               <a:t>‹#›</a:t>
             </a:fld>
-            <a:endParaRPr lang="en-US"/>
+            <a:endParaRPr lang="en-US" dirty="0"/>
           </a:p>
         </p:txBody>
       </p:sp>
@@ -2564,9 +2565,9 @@
           <a:p>
             <a:fld id="{EE844072-81E0-44CE-8CF3-79AEA47A879C}" type="datetimeFigureOut">
               <a:rPr lang="en-US" smtClean="0"/>
-              <a:t>11/20/2020</a:t>
+              <a:t>11/23/2020</a:t>
             </a:fld>
-            <a:endParaRPr lang="en-US"/>
+            <a:endParaRPr lang="en-US" dirty="0"/>
           </a:p>
         </p:txBody>
       </p:sp>
@@ -2603,7 +2604,7 @@
             </a:lvl1pPr>
           </a:lstStyle>
           <a:p>
-            <a:endParaRPr lang="en-US"/>
+            <a:endParaRPr lang="en-US" dirty="0"/>
           </a:p>
         </p:txBody>
       </p:sp>
@@ -2644,7 +2645,7 @@
               <a:rPr lang="en-US" smtClean="0"/>
               <a:t>‹#›</a:t>
             </a:fld>
-            <a:endParaRPr lang="en-US"/>
+            <a:endParaRPr lang="en-US" dirty="0"/>
           </a:p>
         </p:txBody>
       </p:sp>
@@ -2978,7 +2979,7 @@
         <p:spPr>
           <a:xfrm>
             <a:off x="510746" y="247135"/>
-            <a:ext cx="1713470" cy="626076"/>
+            <a:ext cx="1713470" cy="222421"/>
           </a:xfrm>
           <a:prstGeom prst="rect">
             <a:avLst/>
@@ -3006,10 +3007,10 @@
           <a:p>
             <a:pPr algn="ctr"/>
             <a:r>
-              <a:rPr lang="en-US" sz="1200" dirty="0" smtClean="0"/>
+              <a:rPr lang="en-US" sz="800" dirty="0" smtClean="0"/>
               <a:t>Component initialization</a:t>
             </a:r>
-            <a:endParaRPr lang="en-US" sz="1200" dirty="0"/>
+            <a:endParaRPr lang="en-US" sz="800" dirty="0"/>
           </a:p>
         </p:txBody>
       </p:sp>
@@ -3021,8 +3022,8 @@
         </p:nvSpPr>
         <p:spPr>
           <a:xfrm>
-            <a:off x="510746" y="1095632"/>
-            <a:ext cx="1713470" cy="626076"/>
+            <a:off x="510746" y="676670"/>
+            <a:ext cx="1713470" cy="220554"/>
           </a:xfrm>
           <a:prstGeom prst="rect">
             <a:avLst/>
@@ -3050,10 +3051,10 @@
           <a:p>
             <a:pPr algn="ctr"/>
             <a:r>
-              <a:rPr lang="en-US" sz="1200" dirty="0" smtClean="0"/>
+              <a:rPr lang="en-US" sz="800" dirty="0" smtClean="0"/>
               <a:t>constructor()</a:t>
             </a:r>
-            <a:endParaRPr lang="en-US" sz="1200" dirty="0"/>
+            <a:endParaRPr lang="en-US" sz="800" dirty="0"/>
           </a:p>
         </p:txBody>
       </p:sp>
@@ -3065,8 +3066,8 @@
         </p:nvSpPr>
         <p:spPr>
           <a:xfrm>
-            <a:off x="131808" y="1942262"/>
-            <a:ext cx="2471351" cy="1040668"/>
+            <a:off x="136776" y="1158995"/>
+            <a:ext cx="2471351" cy="658983"/>
           </a:xfrm>
           <a:prstGeom prst="rect">
             <a:avLst/>
@@ -3094,31 +3095,31 @@
           <a:p>
             <a:pPr algn="ctr"/>
             <a:r>
-              <a:rPr lang="en-US" sz="1200" dirty="0" smtClean="0"/>
+              <a:rPr lang="en-US" sz="800" dirty="0" smtClean="0"/>
               <a:t>static getDerivedStateFromProps()</a:t>
             </a:r>
           </a:p>
           <a:p>
             <a:pPr algn="ctr"/>
             <a:r>
-              <a:rPr lang="en-US" sz="1200" dirty="0" smtClean="0"/>
+              <a:rPr lang="en-US" sz="800" dirty="0" smtClean="0"/>
               <a:t>For write something from props to state</a:t>
             </a:r>
           </a:p>
           <a:p>
             <a:pPr algn="ctr"/>
             <a:r>
-              <a:rPr lang="en-US" sz="1200" dirty="0" smtClean="0"/>
+              <a:rPr lang="en-US" sz="800" dirty="0" smtClean="0"/>
               <a:t>Get props</a:t>
             </a:r>
           </a:p>
           <a:p>
             <a:pPr algn="ctr"/>
             <a:r>
-              <a:rPr lang="en-US" sz="1200" dirty="0" smtClean="0"/>
+              <a:rPr lang="en-US" sz="800" dirty="0" smtClean="0"/>
               <a:t>Return object</a:t>
             </a:r>
-            <a:endParaRPr lang="en-US" sz="1200" dirty="0"/>
+            <a:endParaRPr lang="en-US" sz="800" dirty="0"/>
           </a:p>
         </p:txBody>
       </p:sp>
@@ -3130,8 +3131,8 @@
         </p:nvSpPr>
         <p:spPr>
           <a:xfrm>
-            <a:off x="503539" y="3782202"/>
-            <a:ext cx="1713470" cy="626076"/>
+            <a:off x="1092028" y="1933874"/>
+            <a:ext cx="550906" cy="291749"/>
           </a:xfrm>
           <a:prstGeom prst="rect">
             <a:avLst/>
@@ -3159,14 +3160,14 @@
           <a:p>
             <a:pPr algn="ctr"/>
             <a:r>
-              <a:rPr lang="en-US" sz="1200" dirty="0"/>
+              <a:rPr lang="en-US" sz="800" dirty="0"/>
               <a:t>r</a:t>
             </a:r>
             <a:r>
-              <a:rPr lang="en-US" sz="1200" dirty="0" smtClean="0"/>
+              <a:rPr lang="en-US" sz="800" dirty="0" smtClean="0"/>
               <a:t>ender()</a:t>
             </a:r>
-            <a:endParaRPr lang="en-US" sz="1200" dirty="0"/>
+            <a:endParaRPr lang="en-US" sz="800" dirty="0"/>
           </a:p>
         </p:txBody>
       </p:sp>
@@ -3178,8 +3179,8 @@
         </p:nvSpPr>
         <p:spPr>
           <a:xfrm>
-            <a:off x="503539" y="5064381"/>
-            <a:ext cx="1713470" cy="626076"/>
+            <a:off x="349374" y="5315377"/>
+            <a:ext cx="1713470" cy="190525"/>
           </a:xfrm>
           <a:prstGeom prst="rect">
             <a:avLst/>
@@ -3207,53 +3208,13 @@
           <a:p>
             <a:pPr algn="ctr"/>
             <a:r>
-              <a:rPr lang="en-US" sz="1200" dirty="0" err="1" smtClean="0"/>
-              <a:t>componentDidiMount</a:t>
-            </a:r>
-            <a:r>
-              <a:rPr lang="en-US" sz="1200" dirty="0" smtClean="0"/>
-              <a:t>()</a:t>
-            </a:r>
-            <a:endParaRPr lang="en-US" sz="1200" dirty="0"/>
-          </a:p>
-        </p:txBody>
-      </p:sp>
-      <p:cxnSp>
-        <p:nvCxnSpPr>
-          <p:cNvPr id="30" name="Straight Arrow Connector 29"/>
-          <p:cNvCxnSpPr>
-            <a:stCxn id="25" idx="2"/>
-            <a:endCxn id="26" idx="0"/>
-          </p:cNvCxnSpPr>
-          <p:nvPr/>
-        </p:nvCxnSpPr>
-        <p:spPr>
-          <a:xfrm>
-            <a:off x="1360274" y="4408278"/>
-            <a:ext cx="0" cy="656103"/>
-          </a:xfrm>
-          <a:prstGeom prst="straightConnector1">
-            <a:avLst/>
-          </a:prstGeom>
-          <a:ln>
-            <a:tailEnd type="triangle"/>
-          </a:ln>
-        </p:spPr>
-        <p:style>
-          <a:lnRef idx="1">
-            <a:schemeClr val="accent1"/>
-          </a:lnRef>
-          <a:fillRef idx="0">
-            <a:schemeClr val="accent1"/>
-          </a:fillRef>
-          <a:effectRef idx="0">
-            <a:schemeClr val="accent1"/>
-          </a:effectRef>
-          <a:fontRef idx="minor">
-            <a:schemeClr val="tx1"/>
-          </a:fontRef>
-        </p:style>
-      </p:cxnSp>
+              <a:rPr lang="en-US" sz="800" dirty="0" smtClean="0"/>
+              <a:t>componentDidiMount()</a:t>
+            </a:r>
+            <a:endParaRPr lang="en-US" sz="800" dirty="0"/>
+          </a:p>
+        </p:txBody>
+      </p:sp>
       <p:sp>
         <p:nvSpPr>
           <p:cNvPr id="31" name="Rectangle 30"/>
@@ -3262,8 +3223,8 @@
         </p:nvSpPr>
         <p:spPr>
           <a:xfrm>
-            <a:off x="3667898" y="977758"/>
-            <a:ext cx="1713470" cy="626076"/>
+            <a:off x="5682022" y="688656"/>
+            <a:ext cx="965722" cy="338849"/>
           </a:xfrm>
           <a:prstGeom prst="rect">
             <a:avLst/>
@@ -3291,9 +3252,18 @@
           <a:p>
             <a:pPr algn="ctr"/>
             <a:r>
-              <a:rPr lang="en-US" sz="1200" dirty="0"/>
-              <a:t>props have changed</a:t>
-            </a:r>
+              <a:rPr lang="en-US" sz="800" dirty="0"/>
+              <a:t>props </a:t>
+            </a:r>
+            <a:r>
+              <a:rPr lang="en-US" sz="800" dirty="0" smtClean="0"/>
+              <a:t>has changed</a:t>
+            </a:r>
+            <a:r>
+              <a:rPr lang="en-US" sz="800" dirty="0" smtClean="0"/>
+              <a:t> by parent</a:t>
+            </a:r>
+            <a:endParaRPr lang="en-US" sz="800" dirty="0"/>
           </a:p>
         </p:txBody>
       </p:sp>
@@ -3305,8 +3275,8 @@
         </p:nvSpPr>
         <p:spPr>
           <a:xfrm>
-            <a:off x="6845641" y="968732"/>
-            <a:ext cx="1713470" cy="626076"/>
+            <a:off x="7708803" y="880456"/>
+            <a:ext cx="637131" cy="277684"/>
           </a:xfrm>
           <a:prstGeom prst="rect">
             <a:avLst/>
@@ -3334,10 +3304,10 @@
           <a:p>
             <a:pPr algn="ctr"/>
             <a:r>
-              <a:rPr lang="en-US" sz="1200" dirty="0" smtClean="0"/>
+              <a:rPr lang="en-US" sz="800" dirty="0" smtClean="0"/>
               <a:t>setState()</a:t>
             </a:r>
-            <a:endParaRPr lang="en-US" sz="1200" dirty="0"/>
+            <a:endParaRPr lang="en-US" sz="800" dirty="0"/>
           </a:p>
         </p:txBody>
       </p:sp>
@@ -3378,10 +3348,10 @@
           <a:p>
             <a:pPr algn="ctr"/>
             <a:r>
-              <a:rPr lang="en-US" sz="1200" dirty="0" smtClean="0"/>
+              <a:rPr lang="en-US" sz="800" dirty="0" smtClean="0"/>
               <a:t>Removing a component</a:t>
             </a:r>
-            <a:endParaRPr lang="en-US" sz="1200" dirty="0"/>
+            <a:endParaRPr lang="en-US" sz="800" dirty="0"/>
           </a:p>
         </p:txBody>
       </p:sp>
@@ -3393,8 +3363,8 @@
         </p:nvSpPr>
         <p:spPr>
           <a:xfrm>
-            <a:off x="5243384" y="3218295"/>
-            <a:ext cx="1874109" cy="626076"/>
+            <a:off x="6322514" y="2373657"/>
+            <a:ext cx="1874109" cy="264422"/>
           </a:xfrm>
           <a:prstGeom prst="rect">
             <a:avLst/>
@@ -3422,10 +3392,10 @@
           <a:p>
             <a:pPr algn="ctr"/>
             <a:r>
-              <a:rPr lang="en-US" sz="1200" dirty="0" smtClean="0"/>
+              <a:rPr lang="en-US" sz="800" dirty="0" smtClean="0"/>
               <a:t>shouldComponentUpdate()</a:t>
             </a:r>
-            <a:endParaRPr lang="en-US" sz="1200" dirty="0"/>
+            <a:endParaRPr lang="en-US" sz="800" dirty="0"/>
           </a:p>
         </p:txBody>
       </p:sp>
@@ -3437,8 +3407,8 @@
         </p:nvSpPr>
         <p:spPr>
           <a:xfrm>
-            <a:off x="4864441" y="4790643"/>
-            <a:ext cx="2631989" cy="906161"/>
+            <a:off x="4612957" y="5148196"/>
+            <a:ext cx="2253049" cy="264422"/>
           </a:xfrm>
           <a:prstGeom prst="rect">
             <a:avLst/>
@@ -3466,10 +3436,10 @@
           <a:p>
             <a:pPr algn="ctr"/>
             <a:r>
-              <a:rPr lang="en-US" sz="1200" dirty="0" smtClean="0"/>
+              <a:rPr lang="en-US" sz="800" dirty="0" smtClean="0"/>
               <a:t>getSnapshotBeforeUpdate()</a:t>
             </a:r>
-            <a:endParaRPr lang="en-US" sz="1200" dirty="0"/>
+            <a:endParaRPr lang="en-US" sz="800" dirty="0"/>
           </a:p>
         </p:txBody>
       </p:sp>
@@ -3481,8 +3451,8 @@
         </p:nvSpPr>
         <p:spPr>
           <a:xfrm>
-            <a:off x="5306665" y="5890055"/>
-            <a:ext cx="1747538" cy="626076"/>
+            <a:off x="6566768" y="6500468"/>
+            <a:ext cx="1693163" cy="239355"/>
           </a:xfrm>
           <a:prstGeom prst="rect">
             <a:avLst/>
@@ -3510,10 +3480,10 @@
           <a:p>
             <a:pPr algn="ctr"/>
             <a:r>
-              <a:rPr lang="en-US" sz="1200" dirty="0" smtClean="0"/>
+              <a:rPr lang="en-US" sz="800" dirty="0" smtClean="0"/>
               <a:t>componentDidUpdate()</a:t>
             </a:r>
-            <a:endParaRPr lang="en-US" sz="1200" dirty="0"/>
+            <a:endParaRPr lang="en-US" sz="800" dirty="0"/>
           </a:p>
         </p:txBody>
       </p:sp>
@@ -3525,8 +3495,8 @@
         </p:nvSpPr>
         <p:spPr>
           <a:xfrm>
-            <a:off x="8827866" y="4438305"/>
-            <a:ext cx="2100650" cy="626076"/>
+            <a:off x="10161818" y="2863302"/>
+            <a:ext cx="1391755" cy="333140"/>
           </a:xfrm>
           <a:prstGeom prst="rect">
             <a:avLst/>
@@ -3554,14 +3524,10 @@
           <a:p>
             <a:pPr algn="ctr"/>
             <a:r>
-              <a:rPr lang="en-US" sz="1200" dirty="0" err="1" smtClean="0"/>
-              <a:t>componentWillUnmount</a:t>
-            </a:r>
-            <a:r>
-              <a:rPr lang="en-US" sz="1200" dirty="0" smtClean="0"/>
-              <a:t>()</a:t>
-            </a:r>
-            <a:endParaRPr lang="en-US" sz="1200" dirty="0"/>
+              <a:rPr lang="en-US" sz="800" dirty="0" smtClean="0"/>
+              <a:t>componentWillUnmount()</a:t>
+            </a:r>
+            <a:endParaRPr lang="en-US" sz="800" dirty="0"/>
           </a:p>
         </p:txBody>
       </p:sp>
@@ -3575,9 +3541,9 @@
           <p:nvPr/>
         </p:nvCxnSpPr>
         <p:spPr>
-          <a:xfrm rot="5400000">
-            <a:off x="8585281" y="2166121"/>
-            <a:ext cx="3565094" cy="979274"/>
+          <a:xfrm rot="16200000" flipH="1">
+            <a:off x="9862535" y="1868140"/>
+            <a:ext cx="1990091" cy="231"/>
           </a:xfrm>
           <a:prstGeom prst="bentConnector3">
             <a:avLst/>
@@ -3612,8 +3578,8 @@
         </p:nvCxnSpPr>
         <p:spPr>
           <a:xfrm flipH="1">
-            <a:off x="1360274" y="2982930"/>
-            <a:ext cx="7210" cy="799272"/>
+            <a:off x="1367481" y="1817978"/>
+            <a:ext cx="4971" cy="115896"/>
           </a:xfrm>
           <a:prstGeom prst="straightConnector1">
             <a:avLst/>
@@ -3645,8 +3611,8 @@
         </p:nvSpPr>
         <p:spPr>
           <a:xfrm>
-            <a:off x="5570832" y="342318"/>
-            <a:ext cx="1219203" cy="612436"/>
+            <a:off x="6688451" y="360043"/>
+            <a:ext cx="1219203" cy="334352"/>
           </a:xfrm>
           <a:prstGeom prst="rect">
             <a:avLst/>
@@ -3672,7 +3638,7 @@
           <a:p>
             <a:pPr algn="ctr"/>
             <a:r>
-              <a:rPr lang="en-US" sz="1200" dirty="0">
+              <a:rPr lang="en-US" sz="800" dirty="0">
                 <a:ln w="0"/>
                 <a:solidFill>
                   <a:schemeClr val="accent1"/>
@@ -3688,7 +3654,7 @@
               <a:t>Waits until </a:t>
             </a:r>
             <a:r>
-              <a:rPr lang="en-US" sz="1200" dirty="0" smtClean="0">
+              <a:rPr lang="en-US" sz="800" dirty="0" smtClean="0">
                 <a:ln w="0"/>
                 <a:solidFill>
                   <a:schemeClr val="accent1"/>
@@ -3704,7 +3670,7 @@
               <a:t>props/state </a:t>
             </a:r>
             <a:r>
-              <a:rPr lang="en-US" sz="1200" dirty="0">
+              <a:rPr lang="en-US" sz="800" dirty="0">
                 <a:ln w="0"/>
                 <a:solidFill>
                   <a:schemeClr val="accent1"/>
@@ -3730,8 +3696,8 @@
         </p:nvSpPr>
         <p:spPr>
           <a:xfrm>
-            <a:off x="8477761" y="5793429"/>
-            <a:ext cx="2800860" cy="276999"/>
+            <a:off x="10043191" y="4324815"/>
+            <a:ext cx="1628548" cy="338554"/>
           </a:xfrm>
           <a:prstGeom prst="rect">
             <a:avLst/>
@@ -3759,7 +3725,7 @@
           <a:p>
             <a:pPr algn="ctr"/>
             <a:r>
-              <a:rPr lang="en-US" sz="1200" dirty="0" smtClean="0">
+              <a:rPr lang="en-US" sz="800" dirty="0" smtClean="0">
                 <a:ln w="0"/>
                 <a:solidFill>
                   <a:schemeClr val="accent1"/>
@@ -3775,7 +3741,7 @@
               <a:t>Component </a:t>
             </a:r>
             <a:r>
-              <a:rPr lang="en-US" sz="1200" dirty="0">
+              <a:rPr lang="en-US" sz="800" dirty="0">
                 <a:ln w="0"/>
                 <a:solidFill>
                   <a:schemeClr val="accent1"/>
@@ -3803,9 +3769,9 @@
           <p:nvPr/>
         </p:nvCxnSpPr>
         <p:spPr>
-          <a:xfrm>
-            <a:off x="9878191" y="5064381"/>
-            <a:ext cx="0" cy="729048"/>
+          <a:xfrm flipH="1">
+            <a:off x="10857465" y="3196442"/>
+            <a:ext cx="231" cy="1128373"/>
           </a:xfrm>
           <a:prstGeom prst="straightConnector1">
             <a:avLst/>
@@ -3840,8 +3806,8 @@
         </p:nvCxnSpPr>
         <p:spPr>
           <a:xfrm>
-            <a:off x="1367481" y="873211"/>
-            <a:ext cx="0" cy="222421"/>
+            <a:off x="1367481" y="469556"/>
+            <a:ext cx="0" cy="207114"/>
           </a:xfrm>
           <a:prstGeom prst="straightConnector1">
             <a:avLst/>
@@ -3876,8 +3842,8 @@
         </p:nvCxnSpPr>
         <p:spPr>
           <a:xfrm>
-            <a:off x="1367481" y="1721708"/>
-            <a:ext cx="3" cy="220554"/>
+            <a:off x="1367481" y="897224"/>
+            <a:ext cx="4971" cy="261771"/>
           </a:xfrm>
           <a:prstGeom prst="straightConnector1">
             <a:avLst/>
@@ -3901,78 +3867,6 @@
           </a:fontRef>
         </p:style>
       </p:cxnSp>
-      <p:cxnSp>
-        <p:nvCxnSpPr>
-          <p:cNvPr id="74" name="Elbow Connector 73"/>
-          <p:cNvCxnSpPr>
-            <a:stCxn id="89" idx="1"/>
-            <a:endCxn id="31" idx="0"/>
-          </p:cNvCxnSpPr>
-          <p:nvPr/>
-        </p:nvCxnSpPr>
-        <p:spPr>
-          <a:xfrm rot="10800000" flipV="1">
-            <a:off x="4524634" y="648536"/>
-            <a:ext cx="1046199" cy="329222"/>
-          </a:xfrm>
-          <a:prstGeom prst="bentConnector2">
-            <a:avLst/>
-          </a:prstGeom>
-          <a:ln>
-            <a:tailEnd type="triangle"/>
-          </a:ln>
-        </p:spPr>
-        <p:style>
-          <a:lnRef idx="1">
-            <a:schemeClr val="accent1"/>
-          </a:lnRef>
-          <a:fillRef idx="0">
-            <a:schemeClr val="accent1"/>
-          </a:fillRef>
-          <a:effectRef idx="0">
-            <a:schemeClr val="accent1"/>
-          </a:effectRef>
-          <a:fontRef idx="minor">
-            <a:schemeClr val="tx1"/>
-          </a:fontRef>
-        </p:style>
-      </p:cxnSp>
-      <p:cxnSp>
-        <p:nvCxnSpPr>
-          <p:cNvPr id="76" name="Elbow Connector 75"/>
-          <p:cNvCxnSpPr>
-            <a:stCxn id="89" idx="3"/>
-            <a:endCxn id="32" idx="0"/>
-          </p:cNvCxnSpPr>
-          <p:nvPr/>
-        </p:nvCxnSpPr>
-        <p:spPr>
-          <a:xfrm>
-            <a:off x="6790035" y="648536"/>
-            <a:ext cx="912341" cy="320196"/>
-          </a:xfrm>
-          <a:prstGeom prst="bentConnector2">
-            <a:avLst/>
-          </a:prstGeom>
-          <a:ln>
-            <a:tailEnd type="triangle"/>
-          </a:ln>
-        </p:spPr>
-        <p:style>
-          <a:lnRef idx="1">
-            <a:schemeClr val="accent1"/>
-          </a:lnRef>
-          <a:fillRef idx="0">
-            <a:schemeClr val="accent1"/>
-          </a:fillRef>
-          <a:effectRef idx="0">
-            <a:schemeClr val="accent1"/>
-          </a:effectRef>
-          <a:fontRef idx="minor">
-            <a:schemeClr val="tx1"/>
-          </a:fontRef>
-        </p:style>
-      </p:cxnSp>
       <p:sp>
         <p:nvSpPr>
           <p:cNvPr id="87" name="Rectangle 86"/>
@@ -3981,8 +3875,8 @@
         </p:nvSpPr>
         <p:spPr>
           <a:xfrm>
-            <a:off x="4944765" y="1942262"/>
-            <a:ext cx="2471351" cy="1040668"/>
+            <a:off x="6639014" y="1664940"/>
+            <a:ext cx="1856231" cy="515097"/>
           </a:xfrm>
           <a:prstGeom prst="rect">
             <a:avLst/>
@@ -4010,31 +3904,31 @@
           <a:p>
             <a:pPr algn="ctr"/>
             <a:r>
-              <a:rPr lang="en-US" sz="1200" dirty="0" smtClean="0"/>
+              <a:rPr lang="en-US" sz="800" dirty="0" smtClean="0"/>
               <a:t>static getDerivedStateFromProps()</a:t>
             </a:r>
           </a:p>
           <a:p>
             <a:pPr algn="ctr"/>
             <a:r>
-              <a:rPr lang="en-US" sz="1200" dirty="0" smtClean="0"/>
+              <a:rPr lang="en-US" sz="800" dirty="0" smtClean="0"/>
               <a:t>For write something from props to state</a:t>
             </a:r>
           </a:p>
           <a:p>
             <a:pPr algn="ctr"/>
             <a:r>
-              <a:rPr lang="en-US" sz="1200" dirty="0" smtClean="0"/>
+              <a:rPr lang="en-US" sz="800" dirty="0" smtClean="0"/>
               <a:t>Get props</a:t>
             </a:r>
           </a:p>
           <a:p>
             <a:pPr algn="ctr"/>
             <a:r>
-              <a:rPr lang="en-US" sz="1200" dirty="0" smtClean="0"/>
+              <a:rPr lang="en-US" sz="800" dirty="0" smtClean="0"/>
               <a:t>Return object</a:t>
             </a:r>
-            <a:endParaRPr lang="en-US" sz="1200" dirty="0"/>
+            <a:endParaRPr lang="en-US" sz="800" dirty="0"/>
           </a:p>
         </p:txBody>
       </p:sp>
@@ -4049,8 +3943,8 @@
         </p:nvCxnSpPr>
         <p:spPr>
           <a:xfrm rot="16200000" flipH="1">
-            <a:off x="5183323" y="945144"/>
-            <a:ext cx="338428" cy="1655808"/>
+            <a:off x="6547289" y="645098"/>
+            <a:ext cx="637435" cy="1402247"/>
           </a:xfrm>
           <a:prstGeom prst="bentConnector3">
             <a:avLst/>
@@ -4085,8 +3979,8 @@
         </p:nvCxnSpPr>
         <p:spPr>
           <a:xfrm rot="5400000">
-            <a:off x="6767682" y="1007568"/>
-            <a:ext cx="347454" cy="1521935"/>
+            <a:off x="7543850" y="1181421"/>
+            <a:ext cx="506800" cy="460239"/>
           </a:xfrm>
           <a:prstGeom prst="bentConnector3">
             <a:avLst/>
@@ -4118,8 +4012,8 @@
         </p:nvSpPr>
         <p:spPr>
           <a:xfrm>
-            <a:off x="5289630" y="3929202"/>
-            <a:ext cx="1781609" cy="626076"/>
+            <a:off x="6435919" y="2802205"/>
+            <a:ext cx="1647291" cy="235365"/>
           </a:xfrm>
           <a:prstGeom prst="rect">
             <a:avLst/>
@@ -4147,14 +4041,14 @@
           <a:p>
             <a:pPr algn="ctr"/>
             <a:r>
-              <a:rPr lang="en-US" sz="1200" dirty="0"/>
+              <a:rPr lang="en-US" sz="800" dirty="0"/>
               <a:t>r</a:t>
             </a:r>
             <a:r>
-              <a:rPr lang="en-US" sz="1200" dirty="0" smtClean="0"/>
+              <a:rPr lang="en-US" sz="800" dirty="0" smtClean="0"/>
               <a:t>ender()</a:t>
             </a:r>
-            <a:endParaRPr lang="en-US" sz="1200" dirty="0"/>
+            <a:endParaRPr lang="en-US" sz="800" dirty="0"/>
           </a:p>
         </p:txBody>
       </p:sp>
@@ -4169,8 +4063,8 @@
         </p:nvCxnSpPr>
         <p:spPr>
           <a:xfrm rot="5400000">
-            <a:off x="6062758" y="3100611"/>
-            <a:ext cx="235365" cy="2"/>
+            <a:off x="7316540" y="2123067"/>
+            <a:ext cx="193620" cy="307561"/>
           </a:xfrm>
           <a:prstGeom prst="bentConnector3">
             <a:avLst/>
@@ -4205,124 +4099,14 @@
         </p:nvCxnSpPr>
         <p:spPr>
           <a:xfrm flipH="1" flipV="1">
-            <a:off x="6180434" y="342318"/>
-            <a:ext cx="937059" cy="3189015"/>
+            <a:off x="7298053" y="360043"/>
+            <a:ext cx="898570" cy="2145825"/>
           </a:xfrm>
           <a:prstGeom prst="bentConnector4">
             <a:avLst>
-              <a:gd name="adj1" fmla="val -201977"/>
-              <a:gd name="adj2" fmla="val 107168"/>
+              <a:gd name="adj1" fmla="val -74201"/>
+              <a:gd name="adj2" fmla="val 110653"/>
             </a:avLst>
-          </a:prstGeom>
-          <a:ln>
-            <a:tailEnd type="triangle"/>
-          </a:ln>
-        </p:spPr>
-        <p:style>
-          <a:lnRef idx="1">
-            <a:schemeClr val="accent1"/>
-          </a:lnRef>
-          <a:fillRef idx="0">
-            <a:schemeClr val="accent1"/>
-          </a:fillRef>
-          <a:effectRef idx="0">
-            <a:schemeClr val="accent1"/>
-          </a:effectRef>
-          <a:fontRef idx="minor">
-            <a:schemeClr val="tx1"/>
-          </a:fontRef>
-        </p:style>
-      </p:cxnSp>
-      <p:cxnSp>
-        <p:nvCxnSpPr>
-          <p:cNvPr id="111" name="Elbow Connector 110"/>
-          <p:cNvCxnSpPr>
-            <a:stCxn id="36" idx="1"/>
-            <a:endCxn id="103" idx="1"/>
-          </p:cNvCxnSpPr>
-          <p:nvPr/>
-        </p:nvCxnSpPr>
-        <p:spPr>
-          <a:xfrm rot="10800000" flipH="1" flipV="1">
-            <a:off x="5243384" y="3531332"/>
-            <a:ext cx="46246" cy="710907"/>
-          </a:xfrm>
-          <a:prstGeom prst="bentConnector3">
-            <a:avLst>
-              <a:gd name="adj1" fmla="val -2649695"/>
-            </a:avLst>
-          </a:prstGeom>
-          <a:ln>
-            <a:tailEnd type="triangle"/>
-          </a:ln>
-        </p:spPr>
-        <p:style>
-          <a:lnRef idx="1">
-            <a:schemeClr val="accent1"/>
-          </a:lnRef>
-          <a:fillRef idx="0">
-            <a:schemeClr val="accent1"/>
-          </a:fillRef>
-          <a:effectRef idx="0">
-            <a:schemeClr val="accent1"/>
-          </a:effectRef>
-          <a:fontRef idx="minor">
-            <a:schemeClr val="tx1"/>
-          </a:fontRef>
-        </p:style>
-      </p:cxnSp>
-      <p:cxnSp>
-        <p:nvCxnSpPr>
-          <p:cNvPr id="114" name="Elbow Connector 113"/>
-          <p:cNvCxnSpPr>
-            <a:stCxn id="103" idx="2"/>
-            <a:endCxn id="37" idx="0"/>
-          </p:cNvCxnSpPr>
-          <p:nvPr/>
-        </p:nvCxnSpPr>
-        <p:spPr>
-          <a:xfrm rot="16200000" flipH="1">
-            <a:off x="6062753" y="4672959"/>
-            <a:ext cx="235365" cy="1"/>
-          </a:xfrm>
-          <a:prstGeom prst="bentConnector3">
-            <a:avLst/>
-          </a:prstGeom>
-          <a:ln>
-            <a:tailEnd type="triangle"/>
-          </a:ln>
-        </p:spPr>
-        <p:style>
-          <a:lnRef idx="1">
-            <a:schemeClr val="accent1"/>
-          </a:lnRef>
-          <a:fillRef idx="0">
-            <a:schemeClr val="accent1"/>
-          </a:fillRef>
-          <a:effectRef idx="0">
-            <a:schemeClr val="accent1"/>
-          </a:effectRef>
-          <a:fontRef idx="minor">
-            <a:schemeClr val="tx1"/>
-          </a:fontRef>
-        </p:style>
-      </p:cxnSp>
-      <p:cxnSp>
-        <p:nvCxnSpPr>
-          <p:cNvPr id="125" name="Elbow Connector 124"/>
-          <p:cNvCxnSpPr>
-            <a:stCxn id="37" idx="2"/>
-            <a:endCxn id="38" idx="0"/>
-          </p:cNvCxnSpPr>
-          <p:nvPr/>
-        </p:nvCxnSpPr>
-        <p:spPr>
-          <a:xfrm rot="5400000">
-            <a:off x="6083810" y="5793428"/>
-            <a:ext cx="193251" cy="2"/>
-          </a:xfrm>
-          <a:prstGeom prst="bentConnector3">
-            <a:avLst/>
           </a:prstGeom>
           <a:ln>
             <a:tailEnd type="triangle"/>
@@ -4354,14 +4138,14 @@
         </p:nvCxnSpPr>
         <p:spPr>
           <a:xfrm rot="5400000" flipH="1" flipV="1">
-            <a:off x="1096284" y="606308"/>
-            <a:ext cx="5348139" cy="4820160"/>
+            <a:off x="1679151" y="-112999"/>
+            <a:ext cx="5145859" cy="6091944"/>
           </a:xfrm>
           <a:prstGeom prst="bentConnector5">
             <a:avLst>
-              <a:gd name="adj1" fmla="val -14748"/>
-              <a:gd name="adj2" fmla="val 39746"/>
-              <a:gd name="adj3" fmla="val 104274"/>
+              <a:gd name="adj1" fmla="val -4442"/>
+              <a:gd name="adj2" fmla="val 52028"/>
+              <a:gd name="adj3" fmla="val 104442"/>
             </a:avLst>
           </a:prstGeom>
           <a:ln>
@@ -4391,8 +4175,8 @@
         </p:nvSpPr>
         <p:spPr>
           <a:xfrm>
-            <a:off x="3515710" y="2577662"/>
-            <a:ext cx="1198180" cy="461665"/>
+            <a:off x="4483842" y="1451546"/>
+            <a:ext cx="1198180" cy="338554"/>
           </a:xfrm>
           <a:prstGeom prst="rect">
             <a:avLst/>
@@ -4418,11 +4202,20 @@
           </a:bodyPr>
           <a:lstStyle/>
           <a:p>
-            <a:r>
-              <a:rPr lang="en-US" sz="1200" dirty="0" smtClean="0"/>
-              <a:t>This.state is no updated here</a:t>
-            </a:r>
-            <a:endParaRPr lang="en-US" sz="1200" dirty="0"/>
+            <a:pPr algn="ctr"/>
+            <a:r>
+              <a:rPr lang="en-US" sz="800" dirty="0"/>
+              <a:t>t</a:t>
+            </a:r>
+            <a:r>
+              <a:rPr lang="en-US" sz="800" dirty="0" smtClean="0"/>
+              <a:t>his.state </a:t>
+            </a:r>
+            <a:r>
+              <a:rPr lang="en-US" sz="800" dirty="0" smtClean="0"/>
+              <a:t>is no updated here</a:t>
+            </a:r>
+            <a:endParaRPr lang="en-US" sz="800" dirty="0"/>
           </a:p>
         </p:txBody>
       </p:sp>
@@ -4431,16 +4224,19 @@
           <p:cNvPr id="6" name="Elbow Connector 5"/>
           <p:cNvCxnSpPr>
             <a:stCxn id="2" idx="3"/>
+            <a:endCxn id="36" idx="1"/>
           </p:cNvCxnSpPr>
           <p:nvPr/>
         </p:nvCxnSpPr>
         <p:spPr>
           <a:xfrm>
-            <a:off x="4713890" y="2808495"/>
-            <a:ext cx="150551" cy="533795"/>
-          </a:xfrm>
-          <a:prstGeom prst="bentConnector2">
-            <a:avLst/>
+            <a:off x="5682022" y="1620823"/>
+            <a:ext cx="640492" cy="885045"/>
+          </a:xfrm>
+          <a:prstGeom prst="bentConnector3">
+            <a:avLst>
+              <a:gd name="adj1" fmla="val 50000"/>
+            </a:avLst>
           </a:prstGeom>
           <a:ln>
             <a:tailEnd type="triangle"/>
@@ -4463,14 +4259,1311 @@
       </p:cxnSp>
       <p:cxnSp>
         <p:nvCxnSpPr>
-          <p:cNvPr id="9" name="Elbow Connector 8"/>
-          <p:cNvCxnSpPr/>
+          <p:cNvPr id="83" name="Elbow Connector 82"/>
+          <p:cNvCxnSpPr>
+            <a:stCxn id="36" idx="2"/>
+            <a:endCxn id="103" idx="0"/>
+          </p:cNvCxnSpPr>
           <p:nvPr/>
         </p:nvCxnSpPr>
         <p:spPr>
+          <a:xfrm rot="5400000">
+            <a:off x="7177504" y="2720140"/>
+            <a:ext cx="164126" cy="4"/>
+          </a:xfrm>
+          <a:prstGeom prst="bentConnector3">
+            <a:avLst/>
+          </a:prstGeom>
+          <a:ln>
+            <a:tailEnd type="triangle"/>
+          </a:ln>
+        </p:spPr>
+        <p:style>
+          <a:lnRef idx="1">
+            <a:schemeClr val="accent1"/>
+          </a:lnRef>
+          <a:fillRef idx="0">
+            <a:schemeClr val="accent1"/>
+          </a:fillRef>
+          <a:effectRef idx="0">
+            <a:schemeClr val="accent1"/>
+          </a:effectRef>
+          <a:fontRef idx="minor">
+            <a:schemeClr val="tx1"/>
+          </a:fontRef>
+        </p:style>
+      </p:cxnSp>
+      <p:sp>
+        <p:nvSpPr>
+          <p:cNvPr id="88" name="TextBox 87"/>
+          <p:cNvSpPr txBox="1"/>
+          <p:nvPr/>
+        </p:nvSpPr>
+        <p:spPr>
           <a:xfrm>
-            <a:off x="4864441" y="3342290"/>
-            <a:ext cx="378942" cy="63062"/>
+            <a:off x="3008120" y="5241362"/>
+            <a:ext cx="1065084" cy="338554"/>
+          </a:xfrm>
+          <a:prstGeom prst="rect">
+            <a:avLst/>
+          </a:prstGeom>
+        </p:spPr>
+        <p:style>
+          <a:lnRef idx="2">
+            <a:schemeClr val="accent6">
+              <a:shade val="50000"/>
+            </a:schemeClr>
+          </a:lnRef>
+          <a:fillRef idx="1">
+            <a:schemeClr val="accent6"/>
+          </a:fillRef>
+          <a:effectRef idx="0">
+            <a:schemeClr val="accent6"/>
+          </a:effectRef>
+          <a:fontRef idx="minor">
+            <a:schemeClr val="lt1"/>
+          </a:fontRef>
+        </p:style>
+        <p:txBody>
+          <a:bodyPr wrap="square" rtlCol="0">
+            <a:spAutoFit/>
+          </a:bodyPr>
+          <a:lstStyle/>
+          <a:p>
+            <a:pPr algn="ctr"/>
+            <a:r>
+              <a:rPr lang="en-US" sz="800" dirty="0" smtClean="0"/>
+              <a:t>Excellent place to get </a:t>
+            </a:r>
+            <a:r>
+              <a:rPr lang="en-US" sz="800" dirty="0" smtClean="0">
+                <a:hlinkClick r:id="rId2" action="ppaction://hlinksldjump"/>
+              </a:rPr>
+              <a:t>side effects</a:t>
+            </a:r>
+            <a:endParaRPr lang="en-US" sz="800" dirty="0"/>
+          </a:p>
+        </p:txBody>
+      </p:sp>
+      <p:sp>
+        <p:nvSpPr>
+          <p:cNvPr id="93" name="TextBox 92"/>
+          <p:cNvSpPr txBox="1"/>
+          <p:nvPr/>
+        </p:nvSpPr>
+        <p:spPr>
+          <a:xfrm>
+            <a:off x="1063851" y="6281592"/>
+            <a:ext cx="1678264" cy="338554"/>
+          </a:xfrm>
+          <a:prstGeom prst="rect">
+            <a:avLst/>
+          </a:prstGeom>
+        </p:spPr>
+        <p:style>
+          <a:lnRef idx="2">
+            <a:schemeClr val="accent6">
+              <a:shade val="50000"/>
+            </a:schemeClr>
+          </a:lnRef>
+          <a:fillRef idx="1">
+            <a:schemeClr val="accent6"/>
+          </a:fillRef>
+          <a:effectRef idx="0">
+            <a:schemeClr val="accent6"/>
+          </a:effectRef>
+          <a:fontRef idx="minor">
+            <a:schemeClr val="lt1"/>
+          </a:fontRef>
+        </p:style>
+        <p:txBody>
+          <a:bodyPr wrap="square" rtlCol="0">
+            <a:spAutoFit/>
+          </a:bodyPr>
+          <a:lstStyle/>
+          <a:p>
+            <a:pPr algn="ctr"/>
+            <a:r>
+              <a:rPr lang="en-US" sz="800" dirty="0" smtClean="0"/>
+              <a:t>draw/update</a:t>
+            </a:r>
+          </a:p>
+          <a:p>
+            <a:pPr algn="ctr"/>
+            <a:r>
+              <a:rPr lang="en-US" sz="800" dirty="0" smtClean="0"/>
+              <a:t>component on front</a:t>
+            </a:r>
+            <a:endParaRPr lang="en-US" sz="800" dirty="0"/>
+          </a:p>
+        </p:txBody>
+      </p:sp>
+      <p:cxnSp>
+        <p:nvCxnSpPr>
+          <p:cNvPr id="95" name="Elbow Connector 94"/>
+          <p:cNvCxnSpPr>
+            <a:stCxn id="93" idx="3"/>
+            <a:endCxn id="38" idx="1"/>
+          </p:cNvCxnSpPr>
+          <p:nvPr/>
+        </p:nvCxnSpPr>
+        <p:spPr>
+          <a:xfrm>
+            <a:off x="2742115" y="6450869"/>
+            <a:ext cx="3824653" cy="169277"/>
+          </a:xfrm>
+          <a:prstGeom prst="bentConnector3">
+            <a:avLst/>
+          </a:prstGeom>
+          <a:ln>
+            <a:tailEnd type="triangle"/>
+          </a:ln>
+        </p:spPr>
+        <p:style>
+          <a:lnRef idx="1">
+            <a:schemeClr val="accent1"/>
+          </a:lnRef>
+          <a:fillRef idx="0">
+            <a:schemeClr val="accent1"/>
+          </a:fillRef>
+          <a:effectRef idx="0">
+            <a:schemeClr val="accent1"/>
+          </a:effectRef>
+          <a:fontRef idx="minor">
+            <a:schemeClr val="tx1"/>
+          </a:fontRef>
+        </p:style>
+      </p:cxnSp>
+      <p:cxnSp>
+        <p:nvCxnSpPr>
+          <p:cNvPr id="101" name="Elbow Connector 100"/>
+          <p:cNvCxnSpPr>
+            <a:stCxn id="93" idx="1"/>
+            <a:endCxn id="26" idx="1"/>
+          </p:cNvCxnSpPr>
+          <p:nvPr/>
+        </p:nvCxnSpPr>
+        <p:spPr>
+          <a:xfrm rot="10800000">
+            <a:off x="349375" y="5410641"/>
+            <a:ext cx="714477" cy="1040229"/>
+          </a:xfrm>
+          <a:prstGeom prst="bentConnector3">
+            <a:avLst>
+              <a:gd name="adj1" fmla="val 131995"/>
+            </a:avLst>
+          </a:prstGeom>
+          <a:ln>
+            <a:tailEnd type="triangle"/>
+          </a:ln>
+        </p:spPr>
+        <p:style>
+          <a:lnRef idx="1">
+            <a:schemeClr val="accent1"/>
+          </a:lnRef>
+          <a:fillRef idx="0">
+            <a:schemeClr val="accent1"/>
+          </a:fillRef>
+          <a:effectRef idx="0">
+            <a:schemeClr val="accent1"/>
+          </a:effectRef>
+          <a:fontRef idx="minor">
+            <a:schemeClr val="tx1"/>
+          </a:fontRef>
+        </p:style>
+      </p:cxnSp>
+      <p:cxnSp>
+        <p:nvCxnSpPr>
+          <p:cNvPr id="106" name="Elbow Connector 105"/>
+          <p:cNvCxnSpPr>
+            <a:stCxn id="38" idx="3"/>
+            <a:endCxn id="89" idx="0"/>
+          </p:cNvCxnSpPr>
+          <p:nvPr/>
+        </p:nvCxnSpPr>
+        <p:spPr>
+          <a:xfrm flipH="1" flipV="1">
+            <a:off x="7298053" y="360043"/>
+            <a:ext cx="961878" cy="6260103"/>
+          </a:xfrm>
+          <a:prstGeom prst="bentConnector4">
+            <a:avLst>
+              <a:gd name="adj1" fmla="val -168001"/>
+              <a:gd name="adj2" fmla="val 103652"/>
+            </a:avLst>
+          </a:prstGeom>
+          <a:ln>
+            <a:tailEnd type="triangle"/>
+          </a:ln>
+        </p:spPr>
+        <p:style>
+          <a:lnRef idx="1">
+            <a:schemeClr val="accent1"/>
+          </a:lnRef>
+          <a:fillRef idx="0">
+            <a:schemeClr val="accent1"/>
+          </a:fillRef>
+          <a:effectRef idx="0">
+            <a:schemeClr val="accent1"/>
+          </a:effectRef>
+          <a:fontRef idx="minor">
+            <a:schemeClr val="tx1"/>
+          </a:fontRef>
+        </p:style>
+      </p:cxnSp>
+      <p:sp>
+        <p:nvSpPr>
+          <p:cNvPr id="156" name="TextBox 155"/>
+          <p:cNvSpPr txBox="1"/>
+          <p:nvPr/>
+        </p:nvSpPr>
+        <p:spPr>
+          <a:xfrm>
+            <a:off x="252061" y="3267512"/>
+            <a:ext cx="1623580" cy="584775"/>
+          </a:xfrm>
+          <a:prstGeom prst="rect">
+            <a:avLst/>
+          </a:prstGeom>
+          <a:solidFill>
+            <a:schemeClr val="accent1">
+              <a:alpha val="50000"/>
+            </a:schemeClr>
+          </a:solidFill>
+          <a:ln>
+            <a:noFill/>
+          </a:ln>
+        </p:spPr>
+        <p:style>
+          <a:lnRef idx="0">
+            <a:scrgbClr r="0" g="0" b="0"/>
+          </a:lnRef>
+          <a:fillRef idx="0">
+            <a:scrgbClr r="0" g="0" b="0"/>
+          </a:fillRef>
+          <a:effectRef idx="0">
+            <a:scrgbClr r="0" g="0" b="0"/>
+          </a:effectRef>
+          <a:fontRef idx="minor">
+            <a:schemeClr val="lt1"/>
+          </a:fontRef>
+        </p:style>
+        <p:txBody>
+          <a:bodyPr wrap="square" rtlCol="0">
+            <a:spAutoFit/>
+          </a:bodyPr>
+          <a:lstStyle/>
+          <a:p>
+            <a:pPr algn="ctr"/>
+            <a:r>
+              <a:rPr lang="en-US" sz="800" dirty="0" smtClean="0"/>
+              <a:t>Child’s</a:t>
+            </a:r>
+          </a:p>
+          <a:p>
+            <a:pPr algn="ctr"/>
+            <a:r>
+              <a:rPr lang="en-US" sz="800" dirty="0" smtClean="0"/>
+              <a:t>constructor() </a:t>
+            </a:r>
+          </a:p>
+          <a:p>
+            <a:pPr algn="ctr"/>
+            <a:r>
+              <a:rPr lang="en-US" sz="800" dirty="0" smtClean="0"/>
+              <a:t>static </a:t>
+            </a:r>
+            <a:r>
+              <a:rPr lang="en-US" sz="800" dirty="0"/>
+              <a:t>getDerivedStateFromProps</a:t>
+            </a:r>
+            <a:r>
+              <a:rPr lang="en-US" sz="800" dirty="0" smtClean="0"/>
+              <a:t>()</a:t>
+            </a:r>
+          </a:p>
+          <a:p>
+            <a:pPr algn="ctr"/>
+            <a:r>
+              <a:rPr lang="en-US" sz="800" dirty="0" smtClean="0"/>
+              <a:t>render()</a:t>
+            </a:r>
+            <a:endParaRPr lang="en-US" sz="800" dirty="0"/>
+          </a:p>
+        </p:txBody>
+      </p:sp>
+      <p:sp>
+        <p:nvSpPr>
+          <p:cNvPr id="169" name="TextBox 168"/>
+          <p:cNvSpPr txBox="1"/>
+          <p:nvPr/>
+        </p:nvSpPr>
+        <p:spPr>
+          <a:xfrm>
+            <a:off x="178786" y="4287763"/>
+            <a:ext cx="1623580" cy="338554"/>
+          </a:xfrm>
+          <a:prstGeom prst="rect">
+            <a:avLst/>
+          </a:prstGeom>
+          <a:solidFill>
+            <a:schemeClr val="accent1">
+              <a:alpha val="50000"/>
+            </a:schemeClr>
+          </a:solidFill>
+          <a:ln>
+            <a:noFill/>
+          </a:ln>
+        </p:spPr>
+        <p:style>
+          <a:lnRef idx="0">
+            <a:scrgbClr r="0" g="0" b="0"/>
+          </a:lnRef>
+          <a:fillRef idx="0">
+            <a:scrgbClr r="0" g="0" b="0"/>
+          </a:fillRef>
+          <a:effectRef idx="0">
+            <a:scrgbClr r="0" g="0" b="0"/>
+          </a:effectRef>
+          <a:fontRef idx="minor">
+            <a:schemeClr val="lt1"/>
+          </a:fontRef>
+        </p:style>
+        <p:txBody>
+          <a:bodyPr wrap="square" rtlCol="0">
+            <a:spAutoFit/>
+          </a:bodyPr>
+          <a:lstStyle/>
+          <a:p>
+            <a:pPr algn="ctr"/>
+            <a:r>
+              <a:rPr lang="en-US" sz="800" dirty="0" smtClean="0"/>
+              <a:t>Child’s</a:t>
+            </a:r>
+          </a:p>
+          <a:p>
+            <a:pPr algn="ctr"/>
+            <a:r>
+              <a:rPr lang="en-US" sz="800" dirty="0"/>
+              <a:t>componentDidiMount</a:t>
+            </a:r>
+            <a:r>
+              <a:rPr lang="en-US" sz="800" dirty="0" smtClean="0"/>
+              <a:t>()</a:t>
+            </a:r>
+            <a:endParaRPr lang="en-US" sz="800" dirty="0"/>
+          </a:p>
+        </p:txBody>
+      </p:sp>
+      <p:cxnSp>
+        <p:nvCxnSpPr>
+          <p:cNvPr id="191" name="Elbow Connector 190"/>
+          <p:cNvCxnSpPr>
+            <a:stCxn id="88" idx="1"/>
+            <a:endCxn id="26" idx="3"/>
+          </p:cNvCxnSpPr>
+          <p:nvPr/>
+        </p:nvCxnSpPr>
+        <p:spPr>
+          <a:xfrm rot="10800000" flipV="1">
+            <a:off x="2062844" y="5410638"/>
+            <a:ext cx="945276" cy="1"/>
+          </a:xfrm>
+          <a:prstGeom prst="bentConnector3">
+            <a:avLst>
+              <a:gd name="adj1" fmla="val 50000"/>
+            </a:avLst>
+          </a:prstGeom>
+          <a:ln>
+            <a:tailEnd type="triangle"/>
+          </a:ln>
+        </p:spPr>
+        <p:style>
+          <a:lnRef idx="1">
+            <a:schemeClr val="accent1"/>
+          </a:lnRef>
+          <a:fillRef idx="0">
+            <a:schemeClr val="accent1"/>
+          </a:fillRef>
+          <a:effectRef idx="0">
+            <a:schemeClr val="accent1"/>
+          </a:effectRef>
+          <a:fontRef idx="minor">
+            <a:schemeClr val="tx1"/>
+          </a:fontRef>
+        </p:style>
+      </p:cxnSp>
+      <p:sp>
+        <p:nvSpPr>
+          <p:cNvPr id="233" name="Diamond 232"/>
+          <p:cNvSpPr/>
+          <p:nvPr/>
+        </p:nvSpPr>
+        <p:spPr>
+          <a:xfrm>
+            <a:off x="558757" y="2348771"/>
+            <a:ext cx="1630191" cy="627222"/>
+          </a:xfrm>
+          <a:prstGeom prst="diamond">
+            <a:avLst/>
+          </a:prstGeom>
+        </p:spPr>
+        <p:style>
+          <a:lnRef idx="2">
+            <a:schemeClr val="accent1">
+              <a:shade val="50000"/>
+            </a:schemeClr>
+          </a:lnRef>
+          <a:fillRef idx="1">
+            <a:schemeClr val="accent1"/>
+          </a:fillRef>
+          <a:effectRef idx="0">
+            <a:schemeClr val="accent1"/>
+          </a:effectRef>
+          <a:fontRef idx="minor">
+            <a:schemeClr val="lt1"/>
+          </a:fontRef>
+        </p:style>
+        <p:txBody>
+          <a:bodyPr rtlCol="0" anchor="ctr"/>
+          <a:lstStyle/>
+          <a:p>
+            <a:pPr algn="ctr"/>
+            <a:r>
+              <a:rPr lang="en-US" sz="800" dirty="0" smtClean="0"/>
+              <a:t>Has child component?</a:t>
+            </a:r>
+            <a:endParaRPr lang="en-US" sz="800" dirty="0"/>
+          </a:p>
+        </p:txBody>
+      </p:sp>
+      <p:cxnSp>
+        <p:nvCxnSpPr>
+          <p:cNvPr id="235" name="Elbow Connector 234"/>
+          <p:cNvCxnSpPr>
+            <a:stCxn id="233" idx="1"/>
+            <a:endCxn id="156" idx="0"/>
+          </p:cNvCxnSpPr>
+          <p:nvPr/>
+        </p:nvCxnSpPr>
+        <p:spPr>
+          <a:xfrm rot="10800000" flipH="1" flipV="1">
+            <a:off x="558757" y="2662382"/>
+            <a:ext cx="505094" cy="605130"/>
+          </a:xfrm>
+          <a:prstGeom prst="bentConnector4">
+            <a:avLst>
+              <a:gd name="adj1" fmla="val -45259"/>
+              <a:gd name="adj2" fmla="val 75913"/>
+            </a:avLst>
+          </a:prstGeom>
+          <a:ln>
+            <a:tailEnd type="triangle"/>
+          </a:ln>
+        </p:spPr>
+        <p:style>
+          <a:lnRef idx="3">
+            <a:schemeClr val="accent5"/>
+          </a:lnRef>
+          <a:fillRef idx="0">
+            <a:schemeClr val="accent5"/>
+          </a:fillRef>
+          <a:effectRef idx="2">
+            <a:schemeClr val="accent5"/>
+          </a:effectRef>
+          <a:fontRef idx="minor">
+            <a:schemeClr val="tx1"/>
+          </a:fontRef>
+        </p:style>
+      </p:cxnSp>
+      <p:cxnSp>
+        <p:nvCxnSpPr>
+          <p:cNvPr id="239" name="Elbow Connector 238"/>
+          <p:cNvCxnSpPr>
+            <a:stCxn id="25" idx="2"/>
+            <a:endCxn id="233" idx="0"/>
+          </p:cNvCxnSpPr>
+          <p:nvPr/>
+        </p:nvCxnSpPr>
+        <p:spPr>
+          <a:xfrm rot="16200000" flipH="1">
+            <a:off x="1309093" y="2284011"/>
+            <a:ext cx="123148" cy="6372"/>
+          </a:xfrm>
+          <a:prstGeom prst="bentConnector3">
+            <a:avLst/>
+          </a:prstGeom>
+          <a:ln>
+            <a:tailEnd type="triangle"/>
+          </a:ln>
+        </p:spPr>
+        <p:style>
+          <a:lnRef idx="1">
+            <a:schemeClr val="accent1"/>
+          </a:lnRef>
+          <a:fillRef idx="0">
+            <a:schemeClr val="accent1"/>
+          </a:fillRef>
+          <a:effectRef idx="0">
+            <a:schemeClr val="accent1"/>
+          </a:effectRef>
+          <a:fontRef idx="minor">
+            <a:schemeClr val="tx1"/>
+          </a:fontRef>
+        </p:style>
+      </p:cxnSp>
+      <p:cxnSp>
+        <p:nvCxnSpPr>
+          <p:cNvPr id="243" name="Elbow Connector 242"/>
+          <p:cNvCxnSpPr>
+            <a:stCxn id="233" idx="3"/>
+            <a:endCxn id="26" idx="0"/>
+          </p:cNvCxnSpPr>
+          <p:nvPr/>
+        </p:nvCxnSpPr>
+        <p:spPr>
+          <a:xfrm flipH="1">
+            <a:off x="1206109" y="2662382"/>
+            <a:ext cx="982839" cy="2652995"/>
+          </a:xfrm>
+          <a:prstGeom prst="bentConnector4">
+            <a:avLst>
+              <a:gd name="adj1" fmla="val -23259"/>
+              <a:gd name="adj2" fmla="val 78889"/>
+            </a:avLst>
+          </a:prstGeom>
+          <a:ln>
+            <a:solidFill>
+              <a:srgbClr val="FF0000"/>
+            </a:solidFill>
+            <a:tailEnd type="triangle"/>
+          </a:ln>
+        </p:spPr>
+        <p:style>
+          <a:lnRef idx="3">
+            <a:schemeClr val="accent1"/>
+          </a:lnRef>
+          <a:fillRef idx="0">
+            <a:schemeClr val="accent1"/>
+          </a:fillRef>
+          <a:effectRef idx="2">
+            <a:schemeClr val="accent1"/>
+          </a:effectRef>
+          <a:fontRef idx="minor">
+            <a:schemeClr val="tx1"/>
+          </a:fontRef>
+        </p:style>
+      </p:cxnSp>
+      <p:cxnSp>
+        <p:nvCxnSpPr>
+          <p:cNvPr id="318" name="Elbow Connector 317"/>
+          <p:cNvCxnSpPr>
+            <a:stCxn id="156" idx="2"/>
+            <a:endCxn id="169" idx="0"/>
+          </p:cNvCxnSpPr>
+          <p:nvPr/>
+        </p:nvCxnSpPr>
+        <p:spPr>
+          <a:xfrm rot="5400000">
+            <a:off x="809476" y="4033388"/>
+            <a:ext cx="435476" cy="73275"/>
+          </a:xfrm>
+          <a:prstGeom prst="bentConnector3">
+            <a:avLst/>
+          </a:prstGeom>
+          <a:ln>
+            <a:tailEnd type="triangle"/>
+          </a:ln>
+        </p:spPr>
+        <p:style>
+          <a:lnRef idx="3">
+            <a:schemeClr val="accent1"/>
+          </a:lnRef>
+          <a:fillRef idx="0">
+            <a:schemeClr val="accent1"/>
+          </a:fillRef>
+          <a:effectRef idx="2">
+            <a:schemeClr val="accent1"/>
+          </a:effectRef>
+          <a:fontRef idx="minor">
+            <a:schemeClr val="tx1"/>
+          </a:fontRef>
+        </p:style>
+      </p:cxnSp>
+      <p:cxnSp>
+        <p:nvCxnSpPr>
+          <p:cNvPr id="241" name="Elbow Connector 240"/>
+          <p:cNvCxnSpPr>
+            <a:stCxn id="169" idx="2"/>
+            <a:endCxn id="26" idx="0"/>
+          </p:cNvCxnSpPr>
+          <p:nvPr/>
+        </p:nvCxnSpPr>
+        <p:spPr>
+          <a:xfrm rot="16200000" flipH="1">
+            <a:off x="753812" y="4863080"/>
+            <a:ext cx="689060" cy="215533"/>
+          </a:xfrm>
+          <a:prstGeom prst="bentConnector3">
+            <a:avLst/>
+          </a:prstGeom>
+          <a:ln>
+            <a:tailEnd type="triangle"/>
+          </a:ln>
+        </p:spPr>
+        <p:style>
+          <a:lnRef idx="3">
+            <a:schemeClr val="accent1"/>
+          </a:lnRef>
+          <a:fillRef idx="0">
+            <a:schemeClr val="accent1"/>
+          </a:fillRef>
+          <a:effectRef idx="2">
+            <a:schemeClr val="accent1"/>
+          </a:effectRef>
+          <a:fontRef idx="minor">
+            <a:schemeClr val="tx1"/>
+          </a:fontRef>
+        </p:style>
+      </p:cxnSp>
+      <p:sp>
+        <p:nvSpPr>
+          <p:cNvPr id="328" name="TextBox 327"/>
+          <p:cNvSpPr txBox="1"/>
+          <p:nvPr/>
+        </p:nvSpPr>
+        <p:spPr>
+          <a:xfrm>
+            <a:off x="4474792" y="2637439"/>
+            <a:ext cx="1216279" cy="338554"/>
+          </a:xfrm>
+          <a:prstGeom prst="rect">
+            <a:avLst/>
+          </a:prstGeom>
+        </p:spPr>
+        <p:style>
+          <a:lnRef idx="3">
+            <a:schemeClr val="lt1"/>
+          </a:lnRef>
+          <a:fillRef idx="1">
+            <a:schemeClr val="accent2"/>
+          </a:fillRef>
+          <a:effectRef idx="1">
+            <a:schemeClr val="accent2"/>
+          </a:effectRef>
+          <a:fontRef idx="minor">
+            <a:schemeClr val="lt1"/>
+          </a:fontRef>
+        </p:style>
+        <p:txBody>
+          <a:bodyPr wrap="square" rtlCol="0">
+            <a:spAutoFit/>
+          </a:bodyPr>
+          <a:lstStyle/>
+          <a:p>
+            <a:pPr algn="ctr"/>
+            <a:r>
+              <a:rPr lang="en-US" sz="800" dirty="0" smtClean="0"/>
+              <a:t>this.state updated to nextState</a:t>
+            </a:r>
+            <a:endParaRPr lang="en-US" sz="800" dirty="0"/>
+          </a:p>
+        </p:txBody>
+      </p:sp>
+      <p:cxnSp>
+        <p:nvCxnSpPr>
+          <p:cNvPr id="330" name="Elbow Connector 329"/>
+          <p:cNvCxnSpPr>
+            <a:stCxn id="328" idx="3"/>
+            <a:endCxn id="103" idx="1"/>
+          </p:cNvCxnSpPr>
+          <p:nvPr/>
+        </p:nvCxnSpPr>
+        <p:spPr>
+          <a:xfrm>
+            <a:off x="5691071" y="2806716"/>
+            <a:ext cx="744848" cy="113172"/>
+          </a:xfrm>
+          <a:prstGeom prst="bentConnector3">
+            <a:avLst/>
+          </a:prstGeom>
+          <a:ln>
+            <a:tailEnd type="triangle"/>
+          </a:ln>
+        </p:spPr>
+        <p:style>
+          <a:lnRef idx="1">
+            <a:schemeClr val="accent1"/>
+          </a:lnRef>
+          <a:fillRef idx="0">
+            <a:schemeClr val="accent1"/>
+          </a:fillRef>
+          <a:effectRef idx="0">
+            <a:schemeClr val="accent1"/>
+          </a:effectRef>
+          <a:fontRef idx="minor">
+            <a:schemeClr val="tx1"/>
+          </a:fontRef>
+        </p:style>
+      </p:cxnSp>
+      <p:sp>
+        <p:nvSpPr>
+          <p:cNvPr id="343" name="Diamond 342"/>
+          <p:cNvSpPr/>
+          <p:nvPr/>
+        </p:nvSpPr>
+        <p:spPr>
+          <a:xfrm>
+            <a:off x="6444468" y="3196442"/>
+            <a:ext cx="1630191" cy="627222"/>
+          </a:xfrm>
+          <a:prstGeom prst="diamond">
+            <a:avLst/>
+          </a:prstGeom>
+        </p:spPr>
+        <p:style>
+          <a:lnRef idx="2">
+            <a:schemeClr val="accent1">
+              <a:shade val="50000"/>
+            </a:schemeClr>
+          </a:lnRef>
+          <a:fillRef idx="1">
+            <a:schemeClr val="accent1"/>
+          </a:fillRef>
+          <a:effectRef idx="0">
+            <a:schemeClr val="accent1"/>
+          </a:effectRef>
+          <a:fontRef idx="minor">
+            <a:schemeClr val="lt1"/>
+          </a:fontRef>
+        </p:style>
+        <p:txBody>
+          <a:bodyPr rtlCol="0" anchor="ctr"/>
+          <a:lstStyle/>
+          <a:p>
+            <a:pPr algn="ctr"/>
+            <a:r>
+              <a:rPr lang="en-US" sz="800" dirty="0" smtClean="0"/>
+              <a:t>Has child component?</a:t>
+            </a:r>
+            <a:endParaRPr lang="en-US" sz="800" dirty="0"/>
+          </a:p>
+        </p:txBody>
+      </p:sp>
+      <p:cxnSp>
+        <p:nvCxnSpPr>
+          <p:cNvPr id="345" name="Elbow Connector 344"/>
+          <p:cNvCxnSpPr>
+            <a:stCxn id="103" idx="2"/>
+            <a:endCxn id="343" idx="0"/>
+          </p:cNvCxnSpPr>
+          <p:nvPr/>
+        </p:nvCxnSpPr>
+        <p:spPr>
+          <a:xfrm rot="5400000">
+            <a:off x="7180129" y="3117006"/>
+            <a:ext cx="158872" cy="1"/>
+          </a:xfrm>
+          <a:prstGeom prst="bentConnector3">
+            <a:avLst/>
+          </a:prstGeom>
+          <a:ln>
+            <a:tailEnd type="triangle"/>
+          </a:ln>
+        </p:spPr>
+        <p:style>
+          <a:lnRef idx="1">
+            <a:schemeClr val="accent1"/>
+          </a:lnRef>
+          <a:fillRef idx="0">
+            <a:schemeClr val="accent1"/>
+          </a:fillRef>
+          <a:effectRef idx="0">
+            <a:schemeClr val="accent1"/>
+          </a:effectRef>
+          <a:fontRef idx="minor">
+            <a:schemeClr val="tx1"/>
+          </a:fontRef>
+        </p:style>
+      </p:cxnSp>
+      <p:cxnSp>
+        <p:nvCxnSpPr>
+          <p:cNvPr id="347" name="Elbow Connector 346"/>
+          <p:cNvCxnSpPr>
+            <a:stCxn id="343" idx="1"/>
+            <a:endCxn id="350" idx="0"/>
+          </p:cNvCxnSpPr>
+          <p:nvPr/>
+        </p:nvCxnSpPr>
+        <p:spPr>
+          <a:xfrm rot="10800000" flipV="1">
+            <a:off x="5346318" y="3510052"/>
+            <a:ext cx="1098151" cy="145349"/>
+          </a:xfrm>
+          <a:prstGeom prst="bentConnector2">
+            <a:avLst/>
+          </a:prstGeom>
+          <a:ln>
+            <a:tailEnd type="triangle"/>
+          </a:ln>
+        </p:spPr>
+        <p:style>
+          <a:lnRef idx="3">
+            <a:schemeClr val="accent5"/>
+          </a:lnRef>
+          <a:fillRef idx="0">
+            <a:schemeClr val="accent5"/>
+          </a:fillRef>
+          <a:effectRef idx="2">
+            <a:schemeClr val="accent5"/>
+          </a:effectRef>
+          <a:fontRef idx="minor">
+            <a:schemeClr val="tx1"/>
+          </a:fontRef>
+        </p:style>
+      </p:cxnSp>
+      <p:sp>
+        <p:nvSpPr>
+          <p:cNvPr id="350" name="TextBox 349"/>
+          <p:cNvSpPr txBox="1"/>
+          <p:nvPr/>
+        </p:nvSpPr>
+        <p:spPr>
+          <a:xfrm>
+            <a:off x="4534527" y="3655402"/>
+            <a:ext cx="1623580" cy="584775"/>
+          </a:xfrm>
+          <a:prstGeom prst="rect">
+            <a:avLst/>
+          </a:prstGeom>
+          <a:solidFill>
+            <a:schemeClr val="accent1">
+              <a:alpha val="50000"/>
+            </a:schemeClr>
+          </a:solidFill>
+          <a:ln>
+            <a:noFill/>
+          </a:ln>
+        </p:spPr>
+        <p:style>
+          <a:lnRef idx="0">
+            <a:scrgbClr r="0" g="0" b="0"/>
+          </a:lnRef>
+          <a:fillRef idx="0">
+            <a:scrgbClr r="0" g="0" b="0"/>
+          </a:fillRef>
+          <a:effectRef idx="0">
+            <a:scrgbClr r="0" g="0" b="0"/>
+          </a:effectRef>
+          <a:fontRef idx="minor">
+            <a:schemeClr val="lt1"/>
+          </a:fontRef>
+        </p:style>
+        <p:txBody>
+          <a:bodyPr wrap="square" rtlCol="0">
+            <a:spAutoFit/>
+          </a:bodyPr>
+          <a:lstStyle/>
+          <a:p>
+            <a:pPr algn="ctr"/>
+            <a:r>
+              <a:rPr lang="en-US" sz="800" dirty="0" smtClean="0"/>
+              <a:t>Child’s</a:t>
+            </a:r>
+          </a:p>
+          <a:p>
+            <a:pPr algn="ctr"/>
+            <a:r>
+              <a:rPr lang="en-US" sz="800" dirty="0" smtClean="0"/>
+              <a:t>constructor() </a:t>
+            </a:r>
+          </a:p>
+          <a:p>
+            <a:pPr algn="ctr"/>
+            <a:r>
+              <a:rPr lang="en-US" sz="800" dirty="0" smtClean="0"/>
+              <a:t>static </a:t>
+            </a:r>
+            <a:r>
+              <a:rPr lang="en-US" sz="800" dirty="0"/>
+              <a:t>getDerivedStateFromProps</a:t>
+            </a:r>
+            <a:r>
+              <a:rPr lang="en-US" sz="800" dirty="0" smtClean="0"/>
+              <a:t>()</a:t>
+            </a:r>
+          </a:p>
+          <a:p>
+            <a:pPr algn="ctr"/>
+            <a:r>
+              <a:rPr lang="en-US" sz="800" dirty="0" smtClean="0"/>
+              <a:t>render()</a:t>
+            </a:r>
+            <a:endParaRPr lang="en-US" sz="800" dirty="0"/>
+          </a:p>
+        </p:txBody>
+      </p:sp>
+      <p:sp>
+        <p:nvSpPr>
+          <p:cNvPr id="351" name="TextBox 350"/>
+          <p:cNvSpPr txBox="1"/>
+          <p:nvPr/>
+        </p:nvSpPr>
+        <p:spPr>
+          <a:xfrm>
+            <a:off x="4533164" y="4409454"/>
+            <a:ext cx="1623580" cy="338554"/>
+          </a:xfrm>
+          <a:prstGeom prst="rect">
+            <a:avLst/>
+          </a:prstGeom>
+          <a:solidFill>
+            <a:schemeClr val="accent1">
+              <a:alpha val="50000"/>
+            </a:schemeClr>
+          </a:solidFill>
+          <a:ln>
+            <a:noFill/>
+          </a:ln>
+        </p:spPr>
+        <p:style>
+          <a:lnRef idx="0">
+            <a:scrgbClr r="0" g="0" b="0"/>
+          </a:lnRef>
+          <a:fillRef idx="0">
+            <a:scrgbClr r="0" g="0" b="0"/>
+          </a:fillRef>
+          <a:effectRef idx="0">
+            <a:scrgbClr r="0" g="0" b="0"/>
+          </a:effectRef>
+          <a:fontRef idx="minor">
+            <a:schemeClr val="lt1"/>
+          </a:fontRef>
+        </p:style>
+        <p:txBody>
+          <a:bodyPr wrap="square" rtlCol="0">
+            <a:spAutoFit/>
+          </a:bodyPr>
+          <a:lstStyle/>
+          <a:p>
+            <a:pPr algn="ctr"/>
+            <a:r>
+              <a:rPr lang="en-US" sz="800" dirty="0" smtClean="0"/>
+              <a:t>Child’s</a:t>
+            </a:r>
+          </a:p>
+          <a:p>
+            <a:pPr algn="ctr"/>
+            <a:r>
+              <a:rPr lang="en-US" sz="800" dirty="0"/>
+              <a:t>getSnapshotBeforeUpdate()</a:t>
+            </a:r>
+            <a:endParaRPr lang="en-US" sz="800" dirty="0"/>
+          </a:p>
+        </p:txBody>
+      </p:sp>
+      <p:cxnSp>
+        <p:nvCxnSpPr>
+          <p:cNvPr id="355" name="Elbow Connector 354"/>
+          <p:cNvCxnSpPr>
+            <a:stCxn id="350" idx="2"/>
+            <a:endCxn id="351" idx="0"/>
+          </p:cNvCxnSpPr>
+          <p:nvPr/>
+        </p:nvCxnSpPr>
+        <p:spPr>
+          <a:xfrm rot="5400000">
+            <a:off x="5260998" y="4324134"/>
+            <a:ext cx="169277" cy="1363"/>
+          </a:xfrm>
+          <a:prstGeom prst="bentConnector3">
+            <a:avLst/>
+          </a:prstGeom>
+          <a:ln>
+            <a:tailEnd type="triangle"/>
+          </a:ln>
+        </p:spPr>
+        <p:style>
+          <a:lnRef idx="1">
+            <a:schemeClr val="accent1"/>
+          </a:lnRef>
+          <a:fillRef idx="0">
+            <a:schemeClr val="accent1"/>
+          </a:fillRef>
+          <a:effectRef idx="0">
+            <a:schemeClr val="accent1"/>
+          </a:effectRef>
+          <a:fontRef idx="minor">
+            <a:schemeClr val="tx1"/>
+          </a:fontRef>
+        </p:style>
+      </p:cxnSp>
+      <p:cxnSp>
+        <p:nvCxnSpPr>
+          <p:cNvPr id="357" name="Elbow Connector 356"/>
+          <p:cNvCxnSpPr>
+            <a:stCxn id="351" idx="2"/>
+            <a:endCxn id="37" idx="0"/>
+          </p:cNvCxnSpPr>
+          <p:nvPr/>
+        </p:nvCxnSpPr>
+        <p:spPr>
+          <a:xfrm rot="16200000" flipH="1">
+            <a:off x="5342124" y="4750838"/>
+            <a:ext cx="400188" cy="394528"/>
+          </a:xfrm>
+          <a:prstGeom prst="bentConnector3">
+            <a:avLst/>
+          </a:prstGeom>
+          <a:ln>
+            <a:tailEnd type="triangle"/>
+          </a:ln>
+        </p:spPr>
+        <p:style>
+          <a:lnRef idx="1">
+            <a:schemeClr val="accent1"/>
+          </a:lnRef>
+          <a:fillRef idx="0">
+            <a:schemeClr val="accent1"/>
+          </a:fillRef>
+          <a:effectRef idx="0">
+            <a:schemeClr val="accent1"/>
+          </a:effectRef>
+          <a:fontRef idx="minor">
+            <a:schemeClr val="tx1"/>
+          </a:fontRef>
+        </p:style>
+      </p:cxnSp>
+      <p:sp>
+        <p:nvSpPr>
+          <p:cNvPr id="358" name="Rectangle 357"/>
+          <p:cNvSpPr/>
+          <p:nvPr/>
+        </p:nvSpPr>
+        <p:spPr>
+          <a:xfrm>
+            <a:off x="5107558" y="5581895"/>
+            <a:ext cx="1263845" cy="398120"/>
+          </a:xfrm>
+          <a:prstGeom prst="rect">
+            <a:avLst/>
+          </a:prstGeom>
+          <a:solidFill>
+            <a:schemeClr val="accent1">
+              <a:alpha val="50000"/>
+            </a:schemeClr>
+          </a:solidFill>
+          <a:ln>
+            <a:noFill/>
+          </a:ln>
+        </p:spPr>
+        <p:style>
+          <a:lnRef idx="0">
+            <a:scrgbClr r="0" g="0" b="0"/>
+          </a:lnRef>
+          <a:fillRef idx="0">
+            <a:scrgbClr r="0" g="0" b="0"/>
+          </a:fillRef>
+          <a:effectRef idx="0">
+            <a:scrgbClr r="0" g="0" b="0"/>
+          </a:effectRef>
+          <a:fontRef idx="minor">
+            <a:schemeClr val="lt1"/>
+          </a:fontRef>
+        </p:style>
+        <p:txBody>
+          <a:bodyPr rtlCol="0" anchor="ctr"/>
+          <a:lstStyle/>
+          <a:p>
+            <a:pPr algn="ctr"/>
+            <a:r>
+              <a:rPr lang="en-US" sz="800" dirty="0" smtClean="0"/>
+              <a:t>Child’s</a:t>
+            </a:r>
+            <a:endParaRPr lang="en-US" sz="800" dirty="0" smtClean="0"/>
+          </a:p>
+          <a:p>
+            <a:pPr algn="ctr"/>
+            <a:r>
+              <a:rPr lang="en-US" sz="800" dirty="0" smtClean="0"/>
+              <a:t>componentDidUpdate</a:t>
+            </a:r>
+            <a:r>
+              <a:rPr lang="en-US" sz="800" dirty="0" smtClean="0"/>
+              <a:t>()</a:t>
+            </a:r>
+            <a:endParaRPr lang="en-US" sz="800" dirty="0"/>
+          </a:p>
+        </p:txBody>
+      </p:sp>
+      <p:cxnSp>
+        <p:nvCxnSpPr>
+          <p:cNvPr id="360" name="Elbow Connector 359"/>
+          <p:cNvCxnSpPr>
+            <a:stCxn id="37" idx="2"/>
+            <a:endCxn id="358" idx="0"/>
+          </p:cNvCxnSpPr>
+          <p:nvPr/>
+        </p:nvCxnSpPr>
+        <p:spPr>
+          <a:xfrm rot="5400000">
+            <a:off x="5654844" y="5497256"/>
+            <a:ext cx="169277" cy="1"/>
+          </a:xfrm>
+          <a:prstGeom prst="bentConnector3">
+            <a:avLst/>
+          </a:prstGeom>
+          <a:ln>
+            <a:tailEnd type="triangle"/>
+          </a:ln>
+        </p:spPr>
+        <p:style>
+          <a:lnRef idx="1">
+            <a:schemeClr val="accent1"/>
+          </a:lnRef>
+          <a:fillRef idx="0">
+            <a:schemeClr val="accent1"/>
+          </a:fillRef>
+          <a:effectRef idx="0">
+            <a:schemeClr val="accent1"/>
+          </a:effectRef>
+          <a:fontRef idx="minor">
+            <a:schemeClr val="tx1"/>
+          </a:fontRef>
+        </p:style>
+      </p:cxnSp>
+      <p:cxnSp>
+        <p:nvCxnSpPr>
+          <p:cNvPr id="362" name="Elbow Connector 361"/>
+          <p:cNvCxnSpPr>
+            <a:stCxn id="358" idx="2"/>
+            <a:endCxn id="38" idx="0"/>
+          </p:cNvCxnSpPr>
+          <p:nvPr/>
+        </p:nvCxnSpPr>
+        <p:spPr>
+          <a:xfrm rot="16200000" flipH="1">
+            <a:off x="6316189" y="5403306"/>
+            <a:ext cx="520453" cy="1673869"/>
+          </a:xfrm>
+          <a:prstGeom prst="bentConnector3">
+            <a:avLst/>
+          </a:prstGeom>
+          <a:ln>
+            <a:tailEnd type="triangle"/>
+          </a:ln>
+        </p:spPr>
+        <p:style>
+          <a:lnRef idx="1">
+            <a:schemeClr val="accent1"/>
+          </a:lnRef>
+          <a:fillRef idx="0">
+            <a:schemeClr val="accent1"/>
+          </a:fillRef>
+          <a:effectRef idx="0">
+            <a:schemeClr val="accent1"/>
+          </a:effectRef>
+          <a:fontRef idx="minor">
+            <a:schemeClr val="tx1"/>
+          </a:fontRef>
+        </p:style>
+      </p:cxnSp>
+      <p:sp>
+        <p:nvSpPr>
+          <p:cNvPr id="363" name="Rectangle 362"/>
+          <p:cNvSpPr/>
+          <p:nvPr/>
+        </p:nvSpPr>
+        <p:spPr>
+          <a:xfrm>
+            <a:off x="7336537" y="4659897"/>
+            <a:ext cx="2253049" cy="264422"/>
+          </a:xfrm>
+          <a:prstGeom prst="rect">
+            <a:avLst/>
+          </a:prstGeom>
+        </p:spPr>
+        <p:style>
+          <a:lnRef idx="2">
+            <a:schemeClr val="accent1">
+              <a:shade val="50000"/>
+            </a:schemeClr>
+          </a:lnRef>
+          <a:fillRef idx="1">
+            <a:schemeClr val="accent1"/>
+          </a:fillRef>
+          <a:effectRef idx="0">
+            <a:schemeClr val="accent1"/>
+          </a:effectRef>
+          <a:fontRef idx="minor">
+            <a:schemeClr val="lt1"/>
+          </a:fontRef>
+        </p:style>
+        <p:txBody>
+          <a:bodyPr rtlCol="0" anchor="ctr"/>
+          <a:lstStyle/>
+          <a:p>
+            <a:pPr algn="ctr"/>
+            <a:r>
+              <a:rPr lang="en-US" sz="800" dirty="0" smtClean="0"/>
+              <a:t>getSnapshotBeforeUpdate()</a:t>
+            </a:r>
+            <a:endParaRPr lang="en-US" sz="800" dirty="0"/>
+          </a:p>
+        </p:txBody>
+      </p:sp>
+      <p:cxnSp>
+        <p:nvCxnSpPr>
+          <p:cNvPr id="365" name="Elbow Connector 364"/>
+          <p:cNvCxnSpPr>
+            <a:stCxn id="343" idx="3"/>
+            <a:endCxn id="363" idx="0"/>
+          </p:cNvCxnSpPr>
+          <p:nvPr/>
+        </p:nvCxnSpPr>
+        <p:spPr>
+          <a:xfrm>
+            <a:off x="8074659" y="3510053"/>
+            <a:ext cx="388403" cy="1149844"/>
+          </a:xfrm>
+          <a:prstGeom prst="bentConnector2">
+            <a:avLst/>
+          </a:prstGeom>
+          <a:ln>
+            <a:solidFill>
+              <a:srgbClr val="FF0000"/>
+            </a:solidFill>
+            <a:tailEnd type="triangle"/>
+          </a:ln>
+        </p:spPr>
+        <p:style>
+          <a:lnRef idx="3">
+            <a:schemeClr val="accent1"/>
+          </a:lnRef>
+          <a:fillRef idx="0">
+            <a:schemeClr val="accent1"/>
+          </a:fillRef>
+          <a:effectRef idx="2">
+            <a:schemeClr val="accent1"/>
+          </a:effectRef>
+          <a:fontRef idx="minor">
+            <a:schemeClr val="tx1"/>
+          </a:fontRef>
+        </p:style>
+      </p:cxnSp>
+      <p:cxnSp>
+        <p:nvCxnSpPr>
+          <p:cNvPr id="367" name="Elbow Connector 366"/>
+          <p:cNvCxnSpPr>
+            <a:stCxn id="363" idx="2"/>
+            <a:endCxn id="38" idx="0"/>
+          </p:cNvCxnSpPr>
+          <p:nvPr/>
+        </p:nvCxnSpPr>
+        <p:spPr>
+          <a:xfrm rot="5400000">
+            <a:off x="7150132" y="5187537"/>
+            <a:ext cx="1576149" cy="1049712"/>
           </a:xfrm>
           <a:prstGeom prst="bentConnector3">
             <a:avLst/>
@@ -4498,6 +5591,185 @@
     <p:extLst>
       <p:ext uri="{BB962C8B-B14F-4D97-AF65-F5344CB8AC3E}">
         <p14:creationId xmlns:p14="http://schemas.microsoft.com/office/powerpoint/2010/main" val="3086648155"/>
+      </p:ext>
+    </p:extLst>
+  </p:cSld>
+  <p:clrMapOvr>
+    <a:masterClrMapping/>
+  </p:clrMapOvr>
+  <p:timing>
+    <p:tnLst>
+      <p:par>
+        <p:cTn id="1" dur="indefinite" restart="never" nodeType="tmRoot"/>
+      </p:par>
+    </p:tnLst>
+  </p:timing>
+</p:sld>
+</file>
+
+<file path=ppt/slides/slide2.xml><?xml version="1.0" encoding="utf-8"?>
+<p:sld xmlns:a="http://schemas.openxmlformats.org/drawingml/2006/main" xmlns:r="http://schemas.openxmlformats.org/officeDocument/2006/relationships" xmlns:p="http://schemas.openxmlformats.org/presentationml/2006/main">
+  <p:cSld>
+    <p:bg>
+      <p:bgPr>
+        <a:solidFill>
+          <a:schemeClr val="accent1"/>
+        </a:solidFill>
+        <a:effectLst/>
+      </p:bgPr>
+    </p:bg>
+    <p:spTree>
+      <p:nvGrpSpPr>
+        <p:cNvPr id="1" name=""/>
+        <p:cNvGrpSpPr/>
+        <p:nvPr/>
+      </p:nvGrpSpPr>
+      <p:grpSpPr>
+        <a:xfrm>
+          <a:off x="0" y="0"/>
+          <a:ext cx="0" cy="0"/>
+          <a:chOff x="0" y="0"/>
+          <a:chExt cx="0" cy="0"/>
+        </a:xfrm>
+      </p:grpSpPr>
+      <p:sp>
+        <p:nvSpPr>
+          <p:cNvPr id="4" name="TextBox 3"/>
+          <p:cNvSpPr txBox="1"/>
+          <p:nvPr/>
+        </p:nvSpPr>
+        <p:spPr>
+          <a:xfrm>
+            <a:off x="0" y="2875469"/>
+            <a:ext cx="12192000" cy="1631216"/>
+          </a:xfrm>
+          <a:prstGeom prst="rect">
+            <a:avLst/>
+          </a:prstGeom>
+        </p:spPr>
+        <p:style>
+          <a:lnRef idx="2">
+            <a:schemeClr val="accent1">
+              <a:shade val="50000"/>
+            </a:schemeClr>
+          </a:lnRef>
+          <a:fillRef idx="1">
+            <a:schemeClr val="accent1"/>
+          </a:fillRef>
+          <a:effectRef idx="0">
+            <a:schemeClr val="accent1"/>
+          </a:effectRef>
+          <a:fontRef idx="minor">
+            <a:schemeClr val="lt1"/>
+          </a:fontRef>
+        </p:style>
+        <p:txBody>
+          <a:bodyPr wrap="square" rtlCol="0">
+            <a:spAutoFit/>
+          </a:bodyPr>
+          <a:lstStyle/>
+          <a:p>
+            <a:pPr marL="3943350" lvl="8" indent="-285750" algn="just">
+              <a:buFont typeface="Arial" panose="020B0604020202020204" pitchFamily="34" charset="0"/>
+              <a:buChar char="•"/>
+            </a:pPr>
+            <a:r>
+              <a:rPr lang="en-US" sz="2000" dirty="0"/>
+              <a:t>Modifying a global variable</a:t>
+            </a:r>
+          </a:p>
+          <a:p>
+            <a:pPr marL="3943350" lvl="8" indent="-285750" algn="just">
+              <a:buFont typeface="Arial" panose="020B0604020202020204" pitchFamily="34" charset="0"/>
+              <a:buChar char="•"/>
+            </a:pPr>
+            <a:r>
+              <a:rPr lang="en-US" sz="2000" dirty="0"/>
+              <a:t>Changing a variable in the parent scope chain</a:t>
+            </a:r>
+          </a:p>
+          <a:p>
+            <a:pPr marL="3943350" lvl="8" indent="-285750" algn="just">
+              <a:buFont typeface="Arial" panose="020B0604020202020204" pitchFamily="34" charset="0"/>
+              <a:buChar char="•"/>
+            </a:pPr>
+            <a:r>
+              <a:rPr lang="en-US" sz="2000" dirty="0"/>
+              <a:t>Screen recording</a:t>
+            </a:r>
+          </a:p>
+          <a:p>
+            <a:pPr marL="3943350" lvl="8" indent="-285750" algn="just">
+              <a:buFont typeface="Arial" panose="020B0604020202020204" pitchFamily="34" charset="0"/>
+              <a:buChar char="•"/>
+            </a:pPr>
+            <a:r>
+              <a:rPr lang="en-US" sz="2000" dirty="0"/>
+              <a:t>Write to file</a:t>
+            </a:r>
+          </a:p>
+          <a:p>
+            <a:pPr marL="3943350" lvl="8" indent="-285750" algn="just">
+              <a:buFont typeface="Arial" panose="020B0604020202020204" pitchFamily="34" charset="0"/>
+              <a:buChar char="•"/>
+            </a:pPr>
+            <a:r>
+              <a:rPr lang="en-US" sz="2000" dirty="0"/>
+              <a:t>Any network request like AJAX request.</a:t>
+            </a:r>
+          </a:p>
+        </p:txBody>
+      </p:sp>
+      <p:sp>
+        <p:nvSpPr>
+          <p:cNvPr id="6" name="TextBox 5"/>
+          <p:cNvSpPr txBox="1"/>
+          <p:nvPr/>
+        </p:nvSpPr>
+        <p:spPr>
+          <a:xfrm>
+            <a:off x="0" y="0"/>
+            <a:ext cx="12192000" cy="1015663"/>
+          </a:xfrm>
+          <a:prstGeom prst="rect">
+            <a:avLst/>
+          </a:prstGeom>
+        </p:spPr>
+        <p:style>
+          <a:lnRef idx="2">
+            <a:schemeClr val="accent1">
+              <a:shade val="50000"/>
+            </a:schemeClr>
+          </a:lnRef>
+          <a:fillRef idx="1">
+            <a:schemeClr val="accent1"/>
+          </a:fillRef>
+          <a:effectRef idx="0">
+            <a:schemeClr val="accent1"/>
+          </a:effectRef>
+          <a:fontRef idx="minor">
+            <a:schemeClr val="lt1"/>
+          </a:fontRef>
+        </p:style>
+        <p:txBody>
+          <a:bodyPr wrap="square" rtlCol="0">
+            <a:spAutoFit/>
+          </a:bodyPr>
+          <a:lstStyle/>
+          <a:p>
+            <a:pPr algn="ctr"/>
+            <a:r>
+              <a:rPr lang="en-US" sz="6000" dirty="0" smtClean="0"/>
+              <a:t>Side effects</a:t>
+            </a:r>
+            <a:endParaRPr lang="en-US" sz="6000" dirty="0"/>
+          </a:p>
+        </p:txBody>
+      </p:sp>
+    </p:spTree>
+    <p:extLst>
+      <p:ext uri="{BB962C8B-B14F-4D97-AF65-F5344CB8AC3E}">
+        <p14:creationId xmlns:p14="http://schemas.microsoft.com/office/powerpoint/2010/main" val="1122040479"/>
       </p:ext>
     </p:extLst>
   </p:cSld>

</xml_diff>